<commit_message>
IPO add issue #2
</commit_message>
<xml_diff>
--- a/Sistem Analizi ve Tasarımı 2. Sunum.pptx
+++ b/Sistem Analizi ve Tasarımı 2. Sunum.pptx
@@ -11,6 +11,7 @@
     <p:sldId id="277" r:id="rId5"/>
     <p:sldId id="278" r:id="rId6"/>
     <p:sldId id="279" r:id="rId7"/>
+    <p:sldId id="281" r:id="rId8"/>
   </p:sldIdLst>
   <p:sldSz cx="12192000" cy="6858000"/>
   <p:notesSz cx="6858000" cy="9144000"/>
@@ -2673,81 +2674,81 @@
     </dgm:pt>
   </dgm:ptLst>
   <dgm:cxnLst>
+    <dgm:cxn modelId="{7D48BEAA-76A2-42B3-8F7E-909561D97C35}" type="presOf" srcId="{F8E54155-6523-4925-A9E4-834A8DC67A18}" destId="{B65A3961-223F-4DD1-B064-04B9176035E1}" srcOrd="0" destOrd="0" presId="urn:microsoft.com/office/officeart/2008/layout/NameandTitleOrganizationalChart"/>
+    <dgm:cxn modelId="{984C368B-F2F4-403C-BDCE-E1FFB1111D2F}" type="presOf" srcId="{D09BB324-C6FD-4553-A418-F732954B5494}" destId="{EA936402-3865-44C5-90A9-363A079BA071}" srcOrd="1" destOrd="0" presId="urn:microsoft.com/office/officeart/2008/layout/NameandTitleOrganizationalChart"/>
+    <dgm:cxn modelId="{654F570A-DC16-4BA1-B927-60F400D11492}" srcId="{E36A11BC-95B9-4DEF-ADF2-FDEBF22C9DB0}" destId="{37A510EB-8119-4716-B62D-15DF8D93BA1C}" srcOrd="1" destOrd="0" parTransId="{6C2C4623-8698-4C30-AEE6-88A183DF427B}" sibTransId="{E7B05799-F9D7-4F33-9CC0-62439E0422E7}"/>
+    <dgm:cxn modelId="{E51CCBCA-BAB1-4013-BA40-6E7E5C656138}" type="presOf" srcId="{FFB2719B-D077-4131-918A-013260B29988}" destId="{BB4C7695-3D4F-4AD8-A4C8-88433B609225}" srcOrd="0" destOrd="0" presId="urn:microsoft.com/office/officeart/2008/layout/NameandTitleOrganizationalChart"/>
+    <dgm:cxn modelId="{7AEED845-C9C8-49FF-AC9E-6E7E20ACD884}" type="presOf" srcId="{A96D31F2-F30C-45CD-B579-6A5F52A3C5E6}" destId="{EE72C551-3B68-4800-90E6-C072F0D82BA7}" srcOrd="0" destOrd="0" presId="urn:microsoft.com/office/officeart/2008/layout/NameandTitleOrganizationalChart"/>
+    <dgm:cxn modelId="{A43EAE16-5DF4-4A33-AD7C-A75EB2982F58}" type="presOf" srcId="{B65D152F-019F-47B7-BBAB-5653AB6A67A7}" destId="{864F4A76-5196-4E91-9A5C-0FFE2352158E}" srcOrd="1" destOrd="0" presId="urn:microsoft.com/office/officeart/2008/layout/NameandTitleOrganizationalChart"/>
+    <dgm:cxn modelId="{B8D7AEB1-3EFB-429A-B1E1-CD717C74DA8B}" type="presOf" srcId="{4E5BA817-AC97-4F63-84AA-A233E9052D5D}" destId="{A7938FD5-E765-4DE0-BA93-F21EE45E3598}" srcOrd="0" destOrd="0" presId="urn:microsoft.com/office/officeart/2008/layout/NameandTitleOrganizationalChart"/>
+    <dgm:cxn modelId="{883FB2FE-D758-443C-B7EF-944FC08E9134}" type="presOf" srcId="{F7198DB6-1654-4CFE-9C20-96474A34334E}" destId="{20ECAAA5-B3C3-4507-AD4B-BE64490ED6C3}" srcOrd="1" destOrd="0" presId="urn:microsoft.com/office/officeart/2008/layout/NameandTitleOrganizationalChart"/>
+    <dgm:cxn modelId="{12E5CDA6-38B8-4A97-BA23-AE456A498FFE}" type="presOf" srcId="{734F5757-16D9-4650-AF96-8AF01DBC3D41}" destId="{17DFFD98-8245-4413-9C31-C6AFDD0DB9E2}" srcOrd="0" destOrd="0" presId="urn:microsoft.com/office/officeart/2008/layout/NameandTitleOrganizationalChart"/>
+    <dgm:cxn modelId="{8222DACC-1C58-4E0F-AD05-7FC15DE35DBD}" type="presOf" srcId="{808517AE-B58C-4595-9900-F7DE8505079C}" destId="{F33866CF-3997-41C4-A78B-FA2DA3508115}" srcOrd="0" destOrd="0" presId="urn:microsoft.com/office/officeart/2008/layout/NameandTitleOrganizationalChart"/>
+    <dgm:cxn modelId="{F0803CD7-2D60-49F7-844C-8DCD003ADC86}" type="presOf" srcId="{D09BB324-C6FD-4553-A418-F732954B5494}" destId="{7D5E766A-4DB9-4964-8B59-CD59CD85DAE3}" srcOrd="0" destOrd="0" presId="urn:microsoft.com/office/officeart/2008/layout/NameandTitleOrganizationalChart"/>
+    <dgm:cxn modelId="{FB8F97E1-04D1-4749-AE69-1F2D91EFD498}" type="presOf" srcId="{F8E54155-6523-4925-A9E4-834A8DC67A18}" destId="{17119D8E-85D2-4DED-93E2-F1CD01D75E22}" srcOrd="1" destOrd="0" presId="urn:microsoft.com/office/officeart/2008/layout/NameandTitleOrganizationalChart"/>
     <dgm:cxn modelId="{1917E334-3133-4BC1-9CCC-02B0DDFA337A}" type="presOf" srcId="{F34E4EA3-EDF0-48A4-9ECC-AF49023215F6}" destId="{0DF480DA-14AF-43A5-920E-1002B9377193}" srcOrd="0" destOrd="0" presId="urn:microsoft.com/office/officeart/2008/layout/NameandTitleOrganizationalChart"/>
+    <dgm:cxn modelId="{FD8DB279-8845-483C-8A92-A22A2677EA9A}" type="presOf" srcId="{37A510EB-8119-4716-B62D-15DF8D93BA1C}" destId="{E79D18BD-16DB-444B-AF8C-11A4E946DAA0}" srcOrd="1" destOrd="0" presId="urn:microsoft.com/office/officeart/2008/layout/NameandTitleOrganizationalChart"/>
+    <dgm:cxn modelId="{5BF7E0E4-F72C-40AA-80CF-6DE2DF6D9348}" type="presOf" srcId="{0E9EFA51-AFB9-4496-8E26-8CFA7231F7D6}" destId="{4A8E3373-E357-45E3-90A4-6938C491376B}" srcOrd="0" destOrd="0" presId="urn:microsoft.com/office/officeart/2008/layout/NameandTitleOrganizationalChart"/>
+    <dgm:cxn modelId="{9C201C90-D1F3-4593-B4F1-354079B5D142}" type="presOf" srcId="{D44DB53E-3BDE-49F9-97DC-3F16080A30AD}" destId="{6E02BC67-A2FB-47B0-8B58-3336B6582D0D}" srcOrd="0" destOrd="0" presId="urn:microsoft.com/office/officeart/2008/layout/NameandTitleOrganizationalChart"/>
+    <dgm:cxn modelId="{E0168E2A-D732-4071-8519-D5578D6D92F8}" type="presOf" srcId="{DE565656-0AE7-483D-9CF1-020F90F9D173}" destId="{4E011B55-A4C5-4391-A0ED-2C2ACFD51BD8}" srcOrd="0" destOrd="0" presId="urn:microsoft.com/office/officeart/2008/layout/NameandTitleOrganizationalChart"/>
+    <dgm:cxn modelId="{024E6F08-3932-4CC9-954A-D0DA469B7227}" type="presOf" srcId="{0E9EFA51-AFB9-4496-8E26-8CFA7231F7D6}" destId="{E716597E-C8BA-4A48-AE48-091A845D04E5}" srcOrd="1" destOrd="0" presId="urn:microsoft.com/office/officeart/2008/layout/NameandTitleOrganizationalChart"/>
+    <dgm:cxn modelId="{6839D73F-930F-4B96-8472-E69F03F3E33A}" srcId="{0E9EFA51-AFB9-4496-8E26-8CFA7231F7D6}" destId="{D8E140AE-3D8C-4488-9E75-278BEC9B5977}" srcOrd="0" destOrd="0" parTransId="{4D93F74A-D479-470B-BB3A-72BC2CE3AFC7}" sibTransId="{F34E4EA3-EDF0-48A4-9ECC-AF49023215F6}"/>
+    <dgm:cxn modelId="{A6DAD7BD-DD1C-4C6D-AC13-84962AA307EB}" type="presOf" srcId="{E22AD6AC-53ED-423A-AC66-040A765A6C8C}" destId="{462028C9-657F-4B36-82F4-652EF24B41DB}" srcOrd="0" destOrd="0" presId="urn:microsoft.com/office/officeart/2008/layout/NameandTitleOrganizationalChart"/>
+    <dgm:cxn modelId="{5C19BE22-D510-4E12-860D-A02B48FEF197}" type="presOf" srcId="{F7198DB6-1654-4CFE-9C20-96474A34334E}" destId="{18545C17-839F-4B48-8454-174CDEC50F1E}" srcOrd="0" destOrd="0" presId="urn:microsoft.com/office/officeart/2008/layout/NameandTitleOrganizationalChart"/>
+    <dgm:cxn modelId="{DD482869-BCC2-4CB5-AE7F-7BE4193520F0}" type="presOf" srcId="{4F26739B-A90D-4FB9-B01E-22A0ED22A730}" destId="{B7BFAFA5-6935-4094-B928-55917E33183C}" srcOrd="0" destOrd="0" presId="urn:microsoft.com/office/officeart/2008/layout/NameandTitleOrganizationalChart"/>
+    <dgm:cxn modelId="{F8D3F8BF-6CD8-4B4E-A7FC-680331D0168C}" type="presOf" srcId="{A905DB41-7664-4298-9C96-AC2F9523208E}" destId="{5E8AE29D-25EA-4C9A-8C2D-CD0168A79B9A}" srcOrd="1" destOrd="0" presId="urn:microsoft.com/office/officeart/2008/layout/NameandTitleOrganizationalChart"/>
+    <dgm:cxn modelId="{C0B15704-7275-427D-802D-2AF71BF0B8A0}" type="presOf" srcId="{5DE5F984-2116-4C0C-97C1-1D1E5E640528}" destId="{355E0B6D-6009-4DA7-A530-358021F5D3C5}" srcOrd="0" destOrd="0" presId="urn:microsoft.com/office/officeart/2008/layout/NameandTitleOrganizationalChart"/>
+    <dgm:cxn modelId="{8EAA80E1-3B07-4E93-9888-4AE0F64D5B36}" type="presOf" srcId="{D8E140AE-3D8C-4488-9E75-278BEC9B5977}" destId="{7B9A750F-9EA9-4F7D-8303-F3E365B84819}" srcOrd="0" destOrd="0" presId="urn:microsoft.com/office/officeart/2008/layout/NameandTitleOrganizationalChart"/>
+    <dgm:cxn modelId="{F2B90FD1-661A-4FBE-8D82-B5CFFF846A23}" srcId="{E36A11BC-95B9-4DEF-ADF2-FDEBF22C9DB0}" destId="{89E13DF5-B5EB-4AB0-9B4C-A80AECD0527B}" srcOrd="2" destOrd="0" parTransId="{504249E1-525A-440D-A9BF-3D6F8BB356A5}" sibTransId="{9875196B-DB6E-4D70-BD5B-3794611CDB61}"/>
+    <dgm:cxn modelId="{96B9BC6E-E392-4295-A169-5712309BE172}" type="presOf" srcId="{9858F3A6-4DE7-44D1-B488-8ACE524787C2}" destId="{77F4B233-54A2-4C47-9288-43C2D83563F4}" srcOrd="0" destOrd="0" presId="urn:microsoft.com/office/officeart/2008/layout/NameandTitleOrganizationalChart"/>
+    <dgm:cxn modelId="{D14F559D-4AAE-4A64-A294-9CDE25C12ED7}" type="presOf" srcId="{4D93F74A-D479-470B-BB3A-72BC2CE3AFC7}" destId="{392506D0-3BB6-42DD-B216-ED12F920E807}" srcOrd="0" destOrd="0" presId="urn:microsoft.com/office/officeart/2008/layout/NameandTitleOrganizationalChart"/>
+    <dgm:cxn modelId="{05D1B8C2-A0E5-4DDF-9247-D2E8F97AB5DF}" srcId="{F7198DB6-1654-4CFE-9C20-96474A34334E}" destId="{F1C21C9B-6A47-4B72-BE60-9C4964F29BE6}" srcOrd="3" destOrd="0" parTransId="{4F26739B-A90D-4FB9-B01E-22A0ED22A730}" sibTransId="{E22AD6AC-53ED-423A-AC66-040A765A6C8C}"/>
+    <dgm:cxn modelId="{A51CB70A-0E72-4E0E-9608-7BB4676943FC}" type="presOf" srcId="{F1C21C9B-6A47-4B72-BE60-9C4964F29BE6}" destId="{B7FE73A9-99F0-4774-906F-91E6F26D9ED8}" srcOrd="1" destOrd="0" presId="urn:microsoft.com/office/officeart/2008/layout/NameandTitleOrganizationalChart"/>
+    <dgm:cxn modelId="{17E1733E-AFA9-4D69-9F53-4D249436BD9E}" type="presOf" srcId="{89E13DF5-B5EB-4AB0-9B4C-A80AECD0527B}" destId="{A35B4B67-CB2F-4AB9-AD78-E5DD5295D98C}" srcOrd="1" destOrd="0" presId="urn:microsoft.com/office/officeart/2008/layout/NameandTitleOrganizationalChart"/>
+    <dgm:cxn modelId="{5FC1B6FD-2E4F-43EF-9547-47CE78FDDE9D}" srcId="{F7198DB6-1654-4CFE-9C20-96474A34334E}" destId="{9661BE61-3BFB-44AA-838E-7B124A199A13}" srcOrd="0" destOrd="0" parTransId="{A06E4BD8-48FC-4F6D-B941-80C1F3DF52D7}" sibTransId="{2FFCBAC4-3E0C-4BFC-AD97-022D0C515278}"/>
+    <dgm:cxn modelId="{10744CC4-D880-4A4E-9FA0-8C2B948291E4}" type="presOf" srcId="{A06E4BD8-48FC-4F6D-B941-80C1F3DF52D7}" destId="{F26368EC-6F5F-4308-B4B7-9DB5C87FA706}" srcOrd="0" destOrd="0" presId="urn:microsoft.com/office/officeart/2008/layout/NameandTitleOrganizationalChart"/>
+    <dgm:cxn modelId="{F11F5184-38A6-45B2-817D-2DBFD7A30D01}" srcId="{E36A11BC-95B9-4DEF-ADF2-FDEBF22C9DB0}" destId="{8589E8AE-7A39-4F96-8BE4-DABFEBB9E204}" srcOrd="0" destOrd="0" parTransId="{48700408-61F3-47D2-B6A9-6E8A68B1EE84}" sibTransId="{59AF0031-614A-45EC-B6C6-3F7CCC35F863}"/>
+    <dgm:cxn modelId="{53EAC021-7D9E-4497-8B46-9EC18D70DB81}" srcId="{F7198DB6-1654-4CFE-9C20-96474A34334E}" destId="{F8E54155-6523-4925-A9E4-834A8DC67A18}" srcOrd="2" destOrd="0" parTransId="{AC36920A-769F-49AD-BBFB-2968F96B38A7}" sibTransId="{5DE5F984-2116-4C0C-97C1-1D1E5E640528}"/>
+    <dgm:cxn modelId="{571A7B4F-AC4D-435A-AE97-8915D730069F}" srcId="{0E9EFA51-AFB9-4496-8E26-8CFA7231F7D6}" destId="{533E1639-F47D-4490-AC48-829D25417314}" srcOrd="2" destOrd="0" parTransId="{734F5757-16D9-4650-AF96-8AF01DBC3D41}" sibTransId="{D44DB53E-3BDE-49F9-97DC-3F16080A30AD}"/>
+    <dgm:cxn modelId="{615D087D-EC2A-40AD-A44B-C567B8601F7D}" srcId="{0E9EFA51-AFB9-4496-8E26-8CFA7231F7D6}" destId="{B65D152F-019F-47B7-BBAB-5653AB6A67A7}" srcOrd="1" destOrd="0" parTransId="{F8B315DD-CCC6-4FC7-8CC8-6F5D4473376A}" sibTransId="{5AB88EC5-8971-41B7-8064-D40FEC55BE93}"/>
+    <dgm:cxn modelId="{C8DD299F-C986-49AA-AB31-BEC99CF90FB6}" type="presOf" srcId="{8589E8AE-7A39-4F96-8BE4-DABFEBB9E204}" destId="{AF6F6726-2500-45A4-87DA-7C6BD810B447}" srcOrd="0" destOrd="0" presId="urn:microsoft.com/office/officeart/2008/layout/NameandTitleOrganizationalChart"/>
+    <dgm:cxn modelId="{8C81263D-971E-4264-BCC9-784C6212F9D0}" type="presOf" srcId="{B65D152F-019F-47B7-BBAB-5653AB6A67A7}" destId="{937DD66D-7493-418C-AE18-73978BF8AC81}" srcOrd="0" destOrd="0" presId="urn:microsoft.com/office/officeart/2008/layout/NameandTitleOrganizationalChart"/>
+    <dgm:cxn modelId="{A032DF03-03B5-484D-B88B-FD337CE2A03E}" type="presOf" srcId="{F1C21C9B-6A47-4B72-BE60-9C4964F29BE6}" destId="{2C3385B8-C91E-43B9-9B60-40FA4B05D6CC}" srcOrd="0" destOrd="0" presId="urn:microsoft.com/office/officeart/2008/layout/NameandTitleOrganizationalChart"/>
+    <dgm:cxn modelId="{B9BA3F7D-C682-4679-8F50-C5A1F56D4C3F}" type="presOf" srcId="{9875196B-DB6E-4D70-BD5B-3794611CDB61}" destId="{E4FFD40F-2E96-4CB6-AC76-4F35F1316BA6}" srcOrd="0" destOrd="0" presId="urn:microsoft.com/office/officeart/2008/layout/NameandTitleOrganizationalChart"/>
+    <dgm:cxn modelId="{92CBB0E5-C3CB-43DC-9668-AB90A5AA1D92}" type="presOf" srcId="{E7B05799-F9D7-4F33-9CC0-62439E0422E7}" destId="{9CF88F62-A2FA-4526-B9F3-259E100D1115}" srcOrd="0" destOrd="0" presId="urn:microsoft.com/office/officeart/2008/layout/NameandTitleOrganizationalChart"/>
+    <dgm:cxn modelId="{24D2FB52-A9BB-4F70-A911-86F50EDAFB70}" type="presOf" srcId="{E36A11BC-95B9-4DEF-ADF2-FDEBF22C9DB0}" destId="{97F7B612-8D7D-4BD2-98D6-7878E6F9C7E7}" srcOrd="1" destOrd="0" presId="urn:microsoft.com/office/officeart/2008/layout/NameandTitleOrganizationalChart"/>
+    <dgm:cxn modelId="{9817C133-C1F1-4446-98B1-A7ABA3564AFB}" type="presOf" srcId="{C1C9DB1C-2BA1-44D6-8E44-365E05662309}" destId="{B68174C5-3400-4C0B-A372-F17F76124BC0}" srcOrd="0" destOrd="0" presId="urn:microsoft.com/office/officeart/2008/layout/NameandTitleOrganizationalChart"/>
+    <dgm:cxn modelId="{936EB960-1C98-4E5F-B0BF-8F67FCFDEB20}" type="presOf" srcId="{9661BE61-3BFB-44AA-838E-7B124A199A13}" destId="{58AE309C-738D-446B-9401-9F4B6BB6EAA8}" srcOrd="0" destOrd="0" presId="urn:microsoft.com/office/officeart/2008/layout/NameandTitleOrganizationalChart"/>
     <dgm:cxn modelId="{18487194-98D2-42AB-B4D0-F7F91B45C9D4}" type="presOf" srcId="{37A510EB-8119-4716-B62D-15DF8D93BA1C}" destId="{CEFDAD07-F72C-499B-A1C5-CB44931F66F9}" srcOrd="0" destOrd="0" presId="urn:microsoft.com/office/officeart/2008/layout/NameandTitleOrganizationalChart"/>
-    <dgm:cxn modelId="{12E5CDA6-38B8-4A97-BA23-AE456A498FFE}" type="presOf" srcId="{734F5757-16D9-4650-AF96-8AF01DBC3D41}" destId="{17DFFD98-8245-4413-9C31-C6AFDD0DB9E2}" srcOrd="0" destOrd="0" presId="urn:microsoft.com/office/officeart/2008/layout/NameandTitleOrganizationalChart"/>
     <dgm:cxn modelId="{9356E9C3-4E5D-4A8F-9DAD-31A097718024}" type="presOf" srcId="{70F254AB-4E76-4C99-A819-AA348A8745B0}" destId="{A4DD4E9D-4355-4DD0-818C-39E6702DD289}" srcOrd="0" destOrd="0" presId="urn:microsoft.com/office/officeart/2008/layout/NameandTitleOrganizationalChart"/>
+    <dgm:cxn modelId="{FBEE21EE-2251-4668-A3F6-30B5F1796BCE}" srcId="{D09BB324-C6FD-4553-A418-F732954B5494}" destId="{A905DB41-7664-4298-9C96-AC2F9523208E}" srcOrd="0" destOrd="0" parTransId="{4537E3A4-9652-4862-AD22-646CD24588BA}" sibTransId="{9858F3A6-4DE7-44D1-B488-8ACE524787C2}"/>
+    <dgm:cxn modelId="{C4E8232E-A168-467F-963B-CCE550A25F47}" type="presOf" srcId="{9661BE61-3BFB-44AA-838E-7B124A199A13}" destId="{5E18044D-7F91-4826-91AA-18F5A232C25D}" srcOrd="1" destOrd="0" presId="urn:microsoft.com/office/officeart/2008/layout/NameandTitleOrganizationalChart"/>
+    <dgm:cxn modelId="{95685F87-D2FA-409C-94E6-771BC975B8B1}" srcId="{A905DB41-7664-4298-9C96-AC2F9523208E}" destId="{E36A11BC-95B9-4DEF-ADF2-FDEBF22C9DB0}" srcOrd="0" destOrd="0" parTransId="{BC6D7DCD-AA6E-4766-B9FD-DF41DABB3CC6}" sibTransId="{914913EB-A00D-4F04-A72B-2A36E140CA42}"/>
+    <dgm:cxn modelId="{3EE25E15-B51B-4AFA-AB82-07ADD7A861D9}" type="presOf" srcId="{C246F5F4-F7AC-484B-A097-3B8A865F41A1}" destId="{79D0E6DB-98CB-4EF6-84D1-0A5A3D7E58AF}" srcOrd="0" destOrd="0" presId="urn:microsoft.com/office/officeart/2008/layout/NameandTitleOrganizationalChart"/>
+    <dgm:cxn modelId="{DD33FBF2-BF07-435F-9AB3-CC35507CB39E}" type="presOf" srcId="{F8B315DD-CCC6-4FC7-8CC8-6F5D4473376A}" destId="{6CCF6708-2A02-4CA6-973D-B39AF647E8E5}" srcOrd="0" destOrd="0" presId="urn:microsoft.com/office/officeart/2008/layout/NameandTitleOrganizationalChart"/>
+    <dgm:cxn modelId="{E316FFD0-DD65-4D4A-B4E1-F647E1B3239E}" type="presOf" srcId="{914913EB-A00D-4F04-A72B-2A36E140CA42}" destId="{52399DE7-C757-4180-8BCA-6DD10BFB6D13}" srcOrd="0" destOrd="0" presId="urn:microsoft.com/office/officeart/2008/layout/NameandTitleOrganizationalChart"/>
+    <dgm:cxn modelId="{11D501F7-3AB0-469E-A492-771400922452}" srcId="{5D6F8B04-4E9C-4D4D-88B1-7194E627B30A}" destId="{D09BB324-C6FD-4553-A418-F732954B5494}" srcOrd="0" destOrd="0" parTransId="{BF86B471-0775-477E-89F2-1D7A7A023269}" sibTransId="{A96D31F2-F30C-45CD-B579-6A5F52A3C5E6}"/>
+    <dgm:cxn modelId="{E702B674-AD68-4520-B27A-467337F20B29}" srcId="{D09BB324-C6FD-4553-A418-F732954B5494}" destId="{F7198DB6-1654-4CFE-9C20-96474A34334E}" srcOrd="1" destOrd="0" parTransId="{C246F5F4-F7AC-484B-A097-3B8A865F41A1}" sibTransId="{C1C9DB1C-2BA1-44D6-8E44-365E05662309}"/>
+    <dgm:cxn modelId="{9184BEE7-1C5C-4B3C-B4C6-BF30F0BEECC6}" type="presOf" srcId="{59AF0031-614A-45EC-B6C6-3F7CCC35F863}" destId="{91D6D29E-D415-4189-A49D-A1D4F9A6C5D5}" srcOrd="0" destOrd="0" presId="urn:microsoft.com/office/officeart/2008/layout/NameandTitleOrganizationalChart"/>
+    <dgm:cxn modelId="{37640C7B-E80D-4941-955D-70DBE62EAE45}" type="presOf" srcId="{4537E3A4-9652-4862-AD22-646CD24588BA}" destId="{42E66AF9-5DDD-4A4E-B6C8-FDD140D62873}" srcOrd="0" destOrd="0" presId="urn:microsoft.com/office/officeart/2008/layout/NameandTitleOrganizationalChart"/>
+    <dgm:cxn modelId="{F142BD45-A84C-488D-B91D-44A3FBFD3888}" type="presOf" srcId="{5AB88EC5-8971-41B7-8064-D40FEC55BE93}" destId="{8A911B5B-B703-407A-9A7E-C5A013A358B6}" srcOrd="0" destOrd="0" presId="urn:microsoft.com/office/officeart/2008/layout/NameandTitleOrganizationalChart"/>
+    <dgm:cxn modelId="{7531FBCB-EDC0-4B8E-888F-B44DCC8C168E}" type="presOf" srcId="{E36A11BC-95B9-4DEF-ADF2-FDEBF22C9DB0}" destId="{09E04505-638D-4546-81FE-B772E1335CA8}" srcOrd="0" destOrd="0" presId="urn:microsoft.com/office/officeart/2008/layout/NameandTitleOrganizationalChart"/>
+    <dgm:cxn modelId="{CF0D46A7-9BCC-4EAC-BF9E-68BA677DFC11}" type="presOf" srcId="{BC6D7DCD-AA6E-4766-B9FD-DF41DABB3CC6}" destId="{AEAA815E-FEA1-465A-9B7A-81C225FD237C}" srcOrd="0" destOrd="0" presId="urn:microsoft.com/office/officeart/2008/layout/NameandTitleOrganizationalChart"/>
+    <dgm:cxn modelId="{0E457FB7-20A8-4093-8F7C-9C5569ACB1FC}" type="presOf" srcId="{533E1639-F47D-4490-AC48-829D25417314}" destId="{C4C8168C-DB2A-47A8-9315-777436A2FB97}" srcOrd="0" destOrd="0" presId="urn:microsoft.com/office/officeart/2008/layout/NameandTitleOrganizationalChart"/>
+    <dgm:cxn modelId="{7233C46D-6FDD-4C30-8C33-A21788168BFB}" srcId="{A905DB41-7664-4298-9C96-AC2F9523208E}" destId="{0E9EFA51-AFB9-4496-8E26-8CFA7231F7D6}" srcOrd="1" destOrd="0" parTransId="{70F254AB-4E76-4C99-A819-AA348A8745B0}" sibTransId="{808517AE-B58C-4595-9900-F7DE8505079C}"/>
+    <dgm:cxn modelId="{4D579EF4-5B4A-4D25-A816-115F8F3B7033}" type="presOf" srcId="{4E5BA817-AC97-4F63-84AA-A233E9052D5D}" destId="{9511BFAD-1414-4734-B169-295F9C7F487D}" srcOrd="1" destOrd="0" presId="urn:microsoft.com/office/officeart/2008/layout/NameandTitleOrganizationalChart"/>
     <dgm:cxn modelId="{AC09E125-2408-4093-AAD4-A4B7ACAFC920}" type="presOf" srcId="{6C2C4623-8698-4C30-AEE6-88A183DF427B}" destId="{1FC16436-630C-4EBD-A8B0-0DDD55403769}" srcOrd="0" destOrd="0" presId="urn:microsoft.com/office/officeart/2008/layout/NameandTitleOrganizationalChart"/>
-    <dgm:cxn modelId="{6839D73F-930F-4B96-8472-E69F03F3E33A}" srcId="{0E9EFA51-AFB9-4496-8E26-8CFA7231F7D6}" destId="{D8E140AE-3D8C-4488-9E75-278BEC9B5977}" srcOrd="0" destOrd="0" parTransId="{4D93F74A-D479-470B-BB3A-72BC2CE3AFC7}" sibTransId="{F34E4EA3-EDF0-48A4-9ECC-AF49023215F6}"/>
-    <dgm:cxn modelId="{E316FFD0-DD65-4D4A-B4E1-F647E1B3239E}" type="presOf" srcId="{914913EB-A00D-4F04-A72B-2A36E140CA42}" destId="{52399DE7-C757-4180-8BCA-6DD10BFB6D13}" srcOrd="0" destOrd="0" presId="urn:microsoft.com/office/officeart/2008/layout/NameandTitleOrganizationalChart"/>
-    <dgm:cxn modelId="{A43EAE16-5DF4-4A33-AD7C-A75EB2982F58}" type="presOf" srcId="{B65D152F-019F-47B7-BBAB-5653AB6A67A7}" destId="{864F4A76-5196-4E91-9A5C-0FFE2352158E}" srcOrd="1" destOrd="0" presId="urn:microsoft.com/office/officeart/2008/layout/NameandTitleOrganizationalChart"/>
-    <dgm:cxn modelId="{F142BD45-A84C-488D-B91D-44A3FBFD3888}" type="presOf" srcId="{5AB88EC5-8971-41B7-8064-D40FEC55BE93}" destId="{8A911B5B-B703-407A-9A7E-C5A013A358B6}" srcOrd="0" destOrd="0" presId="urn:microsoft.com/office/officeart/2008/layout/NameandTitleOrganizationalChart"/>
-    <dgm:cxn modelId="{883FB2FE-D758-443C-B7EF-944FC08E9134}" type="presOf" srcId="{F7198DB6-1654-4CFE-9C20-96474A34334E}" destId="{20ECAAA5-B3C3-4507-AD4B-BE64490ED6C3}" srcOrd="1" destOrd="0" presId="urn:microsoft.com/office/officeart/2008/layout/NameandTitleOrganizationalChart"/>
+    <dgm:cxn modelId="{B18ABA33-CC3C-4741-BE5A-325A467F0634}" type="presOf" srcId="{504249E1-525A-440D-A9BF-3D6F8BB356A5}" destId="{6F36E42C-B850-4B8C-8E19-BC163F33D641}" srcOrd="0" destOrd="0" presId="urn:microsoft.com/office/officeart/2008/layout/NameandTitleOrganizationalChart"/>
     <dgm:cxn modelId="{42AA619D-86A4-4781-B0EA-9CFA5207453E}" srcId="{F7198DB6-1654-4CFE-9C20-96474A34334E}" destId="{4E5BA817-AC97-4F63-84AA-A233E9052D5D}" srcOrd="1" destOrd="0" parTransId="{FFB2719B-D077-4131-918A-013260B29988}" sibTransId="{DE565656-0AE7-483D-9CF1-020F90F9D173}"/>
+    <dgm:cxn modelId="{B31F6BEC-42C1-488B-A9AB-ACD8108A3486}" type="presOf" srcId="{48700408-61F3-47D2-B6A9-6E8A68B1EE84}" destId="{019F95AF-2A40-4707-B9BE-8FADB8788A37}" srcOrd="0" destOrd="0" presId="urn:microsoft.com/office/officeart/2008/layout/NameandTitleOrganizationalChart"/>
+    <dgm:cxn modelId="{05AF718C-782B-40A6-B280-A25D7422A296}" type="presOf" srcId="{A905DB41-7664-4298-9C96-AC2F9523208E}" destId="{A05CF574-3438-4691-BF06-02525D7D2E21}" srcOrd="0" destOrd="0" presId="urn:microsoft.com/office/officeart/2008/layout/NameandTitleOrganizationalChart"/>
+    <dgm:cxn modelId="{D4903F0A-BBD7-42EF-A1B8-72FC4D1F7516}" type="presOf" srcId="{D8E140AE-3D8C-4488-9E75-278BEC9B5977}" destId="{5F1A4F56-998C-4DB8-8A6D-19F05967BBE2}" srcOrd="1" destOrd="0" presId="urn:microsoft.com/office/officeart/2008/layout/NameandTitleOrganizationalChart"/>
+    <dgm:cxn modelId="{25F762FB-4430-466F-97D4-BD5D71EAB1B5}" type="presOf" srcId="{2FFCBAC4-3E0C-4BFC-AD97-022D0C515278}" destId="{70D67FEE-55A0-4665-A357-512D7C60F55A}" srcOrd="0" destOrd="0" presId="urn:microsoft.com/office/officeart/2008/layout/NameandTitleOrganizationalChart"/>
     <dgm:cxn modelId="{C2357DE4-EFC3-4872-8D4F-8FBE3908B126}" type="presOf" srcId="{8589E8AE-7A39-4F96-8BE4-DABFEBB9E204}" destId="{B9A6232D-613D-433E-926B-6A1FC360E07B}" srcOrd="1" destOrd="0" presId="urn:microsoft.com/office/officeart/2008/layout/NameandTitleOrganizationalChart"/>
-    <dgm:cxn modelId="{D14F559D-4AAE-4A64-A294-9CDE25C12ED7}" type="presOf" srcId="{4D93F74A-D479-470B-BB3A-72BC2CE3AFC7}" destId="{392506D0-3BB6-42DD-B216-ED12F920E807}" srcOrd="0" destOrd="0" presId="urn:microsoft.com/office/officeart/2008/layout/NameandTitleOrganizationalChart"/>
-    <dgm:cxn modelId="{25F762FB-4430-466F-97D4-BD5D71EAB1B5}" type="presOf" srcId="{2FFCBAC4-3E0C-4BFC-AD97-022D0C515278}" destId="{70D67FEE-55A0-4665-A357-512D7C60F55A}" srcOrd="0" destOrd="0" presId="urn:microsoft.com/office/officeart/2008/layout/NameandTitleOrganizationalChart"/>
-    <dgm:cxn modelId="{A6DAD7BD-DD1C-4C6D-AC13-84962AA307EB}" type="presOf" srcId="{E22AD6AC-53ED-423A-AC66-040A765A6C8C}" destId="{462028C9-657F-4B36-82F4-652EF24B41DB}" srcOrd="0" destOrd="0" presId="urn:microsoft.com/office/officeart/2008/layout/NameandTitleOrganizationalChart"/>
-    <dgm:cxn modelId="{B9BA3F7D-C682-4679-8F50-C5A1F56D4C3F}" type="presOf" srcId="{9875196B-DB6E-4D70-BD5B-3794611CDB61}" destId="{E4FFD40F-2E96-4CB6-AC76-4F35F1316BA6}" srcOrd="0" destOrd="0" presId="urn:microsoft.com/office/officeart/2008/layout/NameandTitleOrganizationalChart"/>
-    <dgm:cxn modelId="{E0168E2A-D732-4071-8519-D5578D6D92F8}" type="presOf" srcId="{DE565656-0AE7-483D-9CF1-020F90F9D173}" destId="{4E011B55-A4C5-4391-A0ED-2C2ACFD51BD8}" srcOrd="0" destOrd="0" presId="urn:microsoft.com/office/officeart/2008/layout/NameandTitleOrganizationalChart"/>
-    <dgm:cxn modelId="{FD8DB279-8845-483C-8A92-A22A2677EA9A}" type="presOf" srcId="{37A510EB-8119-4716-B62D-15DF8D93BA1C}" destId="{E79D18BD-16DB-444B-AF8C-11A4E946DAA0}" srcOrd="1" destOrd="0" presId="urn:microsoft.com/office/officeart/2008/layout/NameandTitleOrganizationalChart"/>
-    <dgm:cxn modelId="{F11F5184-38A6-45B2-817D-2DBFD7A30D01}" srcId="{E36A11BC-95B9-4DEF-ADF2-FDEBF22C9DB0}" destId="{8589E8AE-7A39-4F96-8BE4-DABFEBB9E204}" srcOrd="0" destOrd="0" parTransId="{48700408-61F3-47D2-B6A9-6E8A68B1EE84}" sibTransId="{59AF0031-614A-45EC-B6C6-3F7CCC35F863}"/>
-    <dgm:cxn modelId="{E702B674-AD68-4520-B27A-467337F20B29}" srcId="{D09BB324-C6FD-4553-A418-F732954B5494}" destId="{F7198DB6-1654-4CFE-9C20-96474A34334E}" srcOrd="1" destOrd="0" parTransId="{C246F5F4-F7AC-484B-A097-3B8A865F41A1}" sibTransId="{C1C9DB1C-2BA1-44D6-8E44-365E05662309}"/>
+    <dgm:cxn modelId="{938E23C6-CB73-4F13-AE5B-0BF0691DD504}" type="presOf" srcId="{AC36920A-769F-49AD-BBFB-2968F96B38A7}" destId="{5EAA5B17-6968-42F3-AC29-EB4D37A60556}" srcOrd="0" destOrd="0" presId="urn:microsoft.com/office/officeart/2008/layout/NameandTitleOrganizationalChart"/>
+    <dgm:cxn modelId="{9B22F2E7-A945-42D1-9443-2B3B23DBBF2E}" type="presOf" srcId="{533E1639-F47D-4490-AC48-829D25417314}" destId="{DEDD1980-83A5-46B2-B874-F6F2E1A184F4}" srcOrd="1" destOrd="0" presId="urn:microsoft.com/office/officeart/2008/layout/NameandTitleOrganizationalChart"/>
     <dgm:cxn modelId="{0F4F8B18-76A4-4EE3-8F8F-4E5746C5B997}" type="presOf" srcId="{5D6F8B04-4E9C-4D4D-88B1-7194E627B30A}" destId="{DA011C9A-CE82-4181-8F5B-6933F790B94F}" srcOrd="0" destOrd="0" presId="urn:microsoft.com/office/officeart/2008/layout/NameandTitleOrganizationalChart"/>
-    <dgm:cxn modelId="{9C201C90-D1F3-4593-B4F1-354079B5D142}" type="presOf" srcId="{D44DB53E-3BDE-49F9-97DC-3F16080A30AD}" destId="{6E02BC67-A2FB-47B0-8B58-3336B6582D0D}" srcOrd="0" destOrd="0" presId="urn:microsoft.com/office/officeart/2008/layout/NameandTitleOrganizationalChart"/>
-    <dgm:cxn modelId="{10744CC4-D880-4A4E-9FA0-8C2B948291E4}" type="presOf" srcId="{A06E4BD8-48FC-4F6D-B941-80C1F3DF52D7}" destId="{F26368EC-6F5F-4308-B4B7-9DB5C87FA706}" srcOrd="0" destOrd="0" presId="urn:microsoft.com/office/officeart/2008/layout/NameandTitleOrganizationalChart"/>
-    <dgm:cxn modelId="{024E6F08-3932-4CC9-954A-D0DA469B7227}" type="presOf" srcId="{0E9EFA51-AFB9-4496-8E26-8CFA7231F7D6}" destId="{E716597E-C8BA-4A48-AE48-091A845D04E5}" srcOrd="1" destOrd="0" presId="urn:microsoft.com/office/officeart/2008/layout/NameandTitleOrganizationalChart"/>
-    <dgm:cxn modelId="{9B22F2E7-A945-42D1-9443-2B3B23DBBF2E}" type="presOf" srcId="{533E1639-F47D-4490-AC48-829D25417314}" destId="{DEDD1980-83A5-46B2-B874-F6F2E1A184F4}" srcOrd="1" destOrd="0" presId="urn:microsoft.com/office/officeart/2008/layout/NameandTitleOrganizationalChart"/>
-    <dgm:cxn modelId="{5BF7E0E4-F72C-40AA-80CF-6DE2DF6D9348}" type="presOf" srcId="{0E9EFA51-AFB9-4496-8E26-8CFA7231F7D6}" destId="{4A8E3373-E357-45E3-90A4-6938C491376B}" srcOrd="0" destOrd="0" presId="urn:microsoft.com/office/officeart/2008/layout/NameandTitleOrganizationalChart"/>
-    <dgm:cxn modelId="{7D48BEAA-76A2-42B3-8F7E-909561D97C35}" type="presOf" srcId="{F8E54155-6523-4925-A9E4-834A8DC67A18}" destId="{B65A3961-223F-4DD1-B064-04B9176035E1}" srcOrd="0" destOrd="0" presId="urn:microsoft.com/office/officeart/2008/layout/NameandTitleOrganizationalChart"/>
-    <dgm:cxn modelId="{936EB960-1C98-4E5F-B0BF-8F67FCFDEB20}" type="presOf" srcId="{9661BE61-3BFB-44AA-838E-7B124A199A13}" destId="{58AE309C-738D-446B-9401-9F4B6BB6EAA8}" srcOrd="0" destOrd="0" presId="urn:microsoft.com/office/officeart/2008/layout/NameandTitleOrganizationalChart"/>
-    <dgm:cxn modelId="{96B9BC6E-E392-4295-A169-5712309BE172}" type="presOf" srcId="{9858F3A6-4DE7-44D1-B488-8ACE524787C2}" destId="{77F4B233-54A2-4C47-9288-43C2D83563F4}" srcOrd="0" destOrd="0" presId="urn:microsoft.com/office/officeart/2008/layout/NameandTitleOrganizationalChart"/>
-    <dgm:cxn modelId="{DD33FBF2-BF07-435F-9AB3-CC35507CB39E}" type="presOf" srcId="{F8B315DD-CCC6-4FC7-8CC8-6F5D4473376A}" destId="{6CCF6708-2A02-4CA6-973D-B39AF647E8E5}" srcOrd="0" destOrd="0" presId="urn:microsoft.com/office/officeart/2008/layout/NameandTitleOrganizationalChart"/>
-    <dgm:cxn modelId="{5FC1B6FD-2E4F-43EF-9547-47CE78FDDE9D}" srcId="{F7198DB6-1654-4CFE-9C20-96474A34334E}" destId="{9661BE61-3BFB-44AA-838E-7B124A199A13}" srcOrd="0" destOrd="0" parTransId="{A06E4BD8-48FC-4F6D-B941-80C1F3DF52D7}" sibTransId="{2FFCBAC4-3E0C-4BFC-AD97-022D0C515278}"/>
-    <dgm:cxn modelId="{CF0D46A7-9BCC-4EAC-BF9E-68BA677DFC11}" type="presOf" srcId="{BC6D7DCD-AA6E-4766-B9FD-DF41DABB3CC6}" destId="{AEAA815E-FEA1-465A-9B7A-81C225FD237C}" srcOrd="0" destOrd="0" presId="urn:microsoft.com/office/officeart/2008/layout/NameandTitleOrganizationalChart"/>
-    <dgm:cxn modelId="{8EAA80E1-3B07-4E93-9888-4AE0F64D5B36}" type="presOf" srcId="{D8E140AE-3D8C-4488-9E75-278BEC9B5977}" destId="{7B9A750F-9EA9-4F7D-8303-F3E365B84819}" srcOrd="0" destOrd="0" presId="urn:microsoft.com/office/officeart/2008/layout/NameandTitleOrganizationalChart"/>
-    <dgm:cxn modelId="{571A7B4F-AC4D-435A-AE97-8915D730069F}" srcId="{0E9EFA51-AFB9-4496-8E26-8CFA7231F7D6}" destId="{533E1639-F47D-4490-AC48-829D25417314}" srcOrd="2" destOrd="0" parTransId="{734F5757-16D9-4650-AF96-8AF01DBC3D41}" sibTransId="{D44DB53E-3BDE-49F9-97DC-3F16080A30AD}"/>
-    <dgm:cxn modelId="{11D501F7-3AB0-469E-A492-771400922452}" srcId="{5D6F8B04-4E9C-4D4D-88B1-7194E627B30A}" destId="{D09BB324-C6FD-4553-A418-F732954B5494}" srcOrd="0" destOrd="0" parTransId="{BF86B471-0775-477E-89F2-1D7A7A023269}" sibTransId="{A96D31F2-F30C-45CD-B579-6A5F52A3C5E6}"/>
-    <dgm:cxn modelId="{C8DD299F-C986-49AA-AB31-BEC99CF90FB6}" type="presOf" srcId="{8589E8AE-7A39-4F96-8BE4-DABFEBB9E204}" destId="{AF6F6726-2500-45A4-87DA-7C6BD810B447}" srcOrd="0" destOrd="0" presId="urn:microsoft.com/office/officeart/2008/layout/NameandTitleOrganizationalChart"/>
-    <dgm:cxn modelId="{7233C46D-6FDD-4C30-8C33-A21788168BFB}" srcId="{A905DB41-7664-4298-9C96-AC2F9523208E}" destId="{0E9EFA51-AFB9-4496-8E26-8CFA7231F7D6}" srcOrd="1" destOrd="0" parTransId="{70F254AB-4E76-4C99-A819-AA348A8745B0}" sibTransId="{808517AE-B58C-4595-9900-F7DE8505079C}"/>
-    <dgm:cxn modelId="{C4E8232E-A168-467F-963B-CCE550A25F47}" type="presOf" srcId="{9661BE61-3BFB-44AA-838E-7B124A199A13}" destId="{5E18044D-7F91-4826-91AA-18F5A232C25D}" srcOrd="1" destOrd="0" presId="urn:microsoft.com/office/officeart/2008/layout/NameandTitleOrganizationalChart"/>
-    <dgm:cxn modelId="{C0B15704-7275-427D-802D-2AF71BF0B8A0}" type="presOf" srcId="{5DE5F984-2116-4C0C-97C1-1D1E5E640528}" destId="{355E0B6D-6009-4DA7-A530-358021F5D3C5}" srcOrd="0" destOrd="0" presId="urn:microsoft.com/office/officeart/2008/layout/NameandTitleOrganizationalChart"/>
-    <dgm:cxn modelId="{FBEE21EE-2251-4668-A3F6-30B5F1796BCE}" srcId="{D09BB324-C6FD-4553-A418-F732954B5494}" destId="{A905DB41-7664-4298-9C96-AC2F9523208E}" srcOrd="0" destOrd="0" parTransId="{4537E3A4-9652-4862-AD22-646CD24588BA}" sibTransId="{9858F3A6-4DE7-44D1-B488-8ACE524787C2}"/>
-    <dgm:cxn modelId="{7AEED845-C9C8-49FF-AC9E-6E7E20ACD884}" type="presOf" srcId="{A96D31F2-F30C-45CD-B579-6A5F52A3C5E6}" destId="{EE72C551-3B68-4800-90E6-C072F0D82BA7}" srcOrd="0" destOrd="0" presId="urn:microsoft.com/office/officeart/2008/layout/NameandTitleOrganizationalChart"/>
-    <dgm:cxn modelId="{8222DACC-1C58-4E0F-AD05-7FC15DE35DBD}" type="presOf" srcId="{808517AE-B58C-4595-9900-F7DE8505079C}" destId="{F33866CF-3997-41C4-A78B-FA2DA3508115}" srcOrd="0" destOrd="0" presId="urn:microsoft.com/office/officeart/2008/layout/NameandTitleOrganizationalChart"/>
-    <dgm:cxn modelId="{984C368B-F2F4-403C-BDCE-E1FFB1111D2F}" type="presOf" srcId="{D09BB324-C6FD-4553-A418-F732954B5494}" destId="{EA936402-3865-44C5-90A9-363A079BA071}" srcOrd="1" destOrd="0" presId="urn:microsoft.com/office/officeart/2008/layout/NameandTitleOrganizationalChart"/>
-    <dgm:cxn modelId="{05D1B8C2-A0E5-4DDF-9247-D2E8F97AB5DF}" srcId="{F7198DB6-1654-4CFE-9C20-96474A34334E}" destId="{F1C21C9B-6A47-4B72-BE60-9C4964F29BE6}" srcOrd="3" destOrd="0" parTransId="{4F26739B-A90D-4FB9-B01E-22A0ED22A730}" sibTransId="{E22AD6AC-53ED-423A-AC66-040A765A6C8C}"/>
-    <dgm:cxn modelId="{3EE25E15-B51B-4AFA-AB82-07ADD7A861D9}" type="presOf" srcId="{C246F5F4-F7AC-484B-A097-3B8A865F41A1}" destId="{79D0E6DB-98CB-4EF6-84D1-0A5A3D7E58AF}" srcOrd="0" destOrd="0" presId="urn:microsoft.com/office/officeart/2008/layout/NameandTitleOrganizationalChart"/>
-    <dgm:cxn modelId="{37640C7B-E80D-4941-955D-70DBE62EAE45}" type="presOf" srcId="{4537E3A4-9652-4862-AD22-646CD24588BA}" destId="{42E66AF9-5DDD-4A4E-B6C8-FDD140D62873}" srcOrd="0" destOrd="0" presId="urn:microsoft.com/office/officeart/2008/layout/NameandTitleOrganizationalChart"/>
-    <dgm:cxn modelId="{9184BEE7-1C5C-4B3C-B4C6-BF30F0BEECC6}" type="presOf" srcId="{59AF0031-614A-45EC-B6C6-3F7CCC35F863}" destId="{91D6D29E-D415-4189-A49D-A1D4F9A6C5D5}" srcOrd="0" destOrd="0" presId="urn:microsoft.com/office/officeart/2008/layout/NameandTitleOrganizationalChart"/>
-    <dgm:cxn modelId="{8C81263D-971E-4264-BCC9-784C6212F9D0}" type="presOf" srcId="{B65D152F-019F-47B7-BBAB-5653AB6A67A7}" destId="{937DD66D-7493-418C-AE18-73978BF8AC81}" srcOrd="0" destOrd="0" presId="urn:microsoft.com/office/officeart/2008/layout/NameandTitleOrganizationalChart"/>
-    <dgm:cxn modelId="{D4903F0A-BBD7-42EF-A1B8-72FC4D1F7516}" type="presOf" srcId="{D8E140AE-3D8C-4488-9E75-278BEC9B5977}" destId="{5F1A4F56-998C-4DB8-8A6D-19F05967BBE2}" srcOrd="1" destOrd="0" presId="urn:microsoft.com/office/officeart/2008/layout/NameandTitleOrganizationalChart"/>
-    <dgm:cxn modelId="{95685F87-D2FA-409C-94E6-771BC975B8B1}" srcId="{A905DB41-7664-4298-9C96-AC2F9523208E}" destId="{E36A11BC-95B9-4DEF-ADF2-FDEBF22C9DB0}" srcOrd="0" destOrd="0" parTransId="{BC6D7DCD-AA6E-4766-B9FD-DF41DABB3CC6}" sibTransId="{914913EB-A00D-4F04-A72B-2A36E140CA42}"/>
-    <dgm:cxn modelId="{53EAC021-7D9E-4497-8B46-9EC18D70DB81}" srcId="{F7198DB6-1654-4CFE-9C20-96474A34334E}" destId="{F8E54155-6523-4925-A9E4-834A8DC67A18}" srcOrd="2" destOrd="0" parTransId="{AC36920A-769F-49AD-BBFB-2968F96B38A7}" sibTransId="{5DE5F984-2116-4C0C-97C1-1D1E5E640528}"/>
-    <dgm:cxn modelId="{5C19BE22-D510-4E12-860D-A02B48FEF197}" type="presOf" srcId="{F7198DB6-1654-4CFE-9C20-96474A34334E}" destId="{18545C17-839F-4B48-8454-174CDEC50F1E}" srcOrd="0" destOrd="0" presId="urn:microsoft.com/office/officeart/2008/layout/NameandTitleOrganizationalChart"/>
-    <dgm:cxn modelId="{B31F6BEC-42C1-488B-A9AB-ACD8108A3486}" type="presOf" srcId="{48700408-61F3-47D2-B6A9-6E8A68B1EE84}" destId="{019F95AF-2A40-4707-B9BE-8FADB8788A37}" srcOrd="0" destOrd="0" presId="urn:microsoft.com/office/officeart/2008/layout/NameandTitleOrganizationalChart"/>
-    <dgm:cxn modelId="{24D2FB52-A9BB-4F70-A911-86F50EDAFB70}" type="presOf" srcId="{E36A11BC-95B9-4DEF-ADF2-FDEBF22C9DB0}" destId="{97F7B612-8D7D-4BD2-98D6-7878E6F9C7E7}" srcOrd="1" destOrd="0" presId="urn:microsoft.com/office/officeart/2008/layout/NameandTitleOrganizationalChart"/>
-    <dgm:cxn modelId="{0E457FB7-20A8-4093-8F7C-9C5569ACB1FC}" type="presOf" srcId="{533E1639-F47D-4490-AC48-829D25417314}" destId="{C4C8168C-DB2A-47A8-9315-777436A2FB97}" srcOrd="0" destOrd="0" presId="urn:microsoft.com/office/officeart/2008/layout/NameandTitleOrganizationalChart"/>
-    <dgm:cxn modelId="{DD482869-BCC2-4CB5-AE7F-7BE4193520F0}" type="presOf" srcId="{4F26739B-A90D-4FB9-B01E-22A0ED22A730}" destId="{B7BFAFA5-6935-4094-B928-55917E33183C}" srcOrd="0" destOrd="0" presId="urn:microsoft.com/office/officeart/2008/layout/NameandTitleOrganizationalChart"/>
     <dgm:cxn modelId="{F33309ED-E536-4568-8A0D-0B1E262A8BEB}" type="presOf" srcId="{89E13DF5-B5EB-4AB0-9B4C-A80AECD0527B}" destId="{ADEEDF48-BBD1-467F-A198-5692AEFC9EDC}" srcOrd="0" destOrd="0" presId="urn:microsoft.com/office/officeart/2008/layout/NameandTitleOrganizationalChart"/>
-    <dgm:cxn modelId="{A032DF03-03B5-484D-B88B-FD337CE2A03E}" type="presOf" srcId="{F1C21C9B-6A47-4B72-BE60-9C4964F29BE6}" destId="{2C3385B8-C91E-43B9-9B60-40FA4B05D6CC}" srcOrd="0" destOrd="0" presId="urn:microsoft.com/office/officeart/2008/layout/NameandTitleOrganizationalChart"/>
-    <dgm:cxn modelId="{05AF718C-782B-40A6-B280-A25D7422A296}" type="presOf" srcId="{A905DB41-7664-4298-9C96-AC2F9523208E}" destId="{A05CF574-3438-4691-BF06-02525D7D2E21}" srcOrd="0" destOrd="0" presId="urn:microsoft.com/office/officeart/2008/layout/NameandTitleOrganizationalChart"/>
-    <dgm:cxn modelId="{A51CB70A-0E72-4E0E-9608-7BB4676943FC}" type="presOf" srcId="{F1C21C9B-6A47-4B72-BE60-9C4964F29BE6}" destId="{B7FE73A9-99F0-4774-906F-91E6F26D9ED8}" srcOrd="1" destOrd="0" presId="urn:microsoft.com/office/officeart/2008/layout/NameandTitleOrganizationalChart"/>
-    <dgm:cxn modelId="{7531FBCB-EDC0-4B8E-888F-B44DCC8C168E}" type="presOf" srcId="{E36A11BC-95B9-4DEF-ADF2-FDEBF22C9DB0}" destId="{09E04505-638D-4546-81FE-B772E1335CA8}" srcOrd="0" destOrd="0" presId="urn:microsoft.com/office/officeart/2008/layout/NameandTitleOrganizationalChart"/>
-    <dgm:cxn modelId="{F8D3F8BF-6CD8-4B4E-A7FC-680331D0168C}" type="presOf" srcId="{A905DB41-7664-4298-9C96-AC2F9523208E}" destId="{5E8AE29D-25EA-4C9A-8C2D-CD0168A79B9A}" srcOrd="1" destOrd="0" presId="urn:microsoft.com/office/officeart/2008/layout/NameandTitleOrganizationalChart"/>
-    <dgm:cxn modelId="{B8D7AEB1-3EFB-429A-B1E1-CD717C74DA8B}" type="presOf" srcId="{4E5BA817-AC97-4F63-84AA-A233E9052D5D}" destId="{A7938FD5-E765-4DE0-BA93-F21EE45E3598}" srcOrd="0" destOrd="0" presId="urn:microsoft.com/office/officeart/2008/layout/NameandTitleOrganizationalChart"/>
-    <dgm:cxn modelId="{615D087D-EC2A-40AD-A44B-C567B8601F7D}" srcId="{0E9EFA51-AFB9-4496-8E26-8CFA7231F7D6}" destId="{B65D152F-019F-47B7-BBAB-5653AB6A67A7}" srcOrd="1" destOrd="0" parTransId="{F8B315DD-CCC6-4FC7-8CC8-6F5D4473376A}" sibTransId="{5AB88EC5-8971-41B7-8064-D40FEC55BE93}"/>
-    <dgm:cxn modelId="{9817C133-C1F1-4446-98B1-A7ABA3564AFB}" type="presOf" srcId="{C1C9DB1C-2BA1-44D6-8E44-365E05662309}" destId="{B68174C5-3400-4C0B-A372-F17F76124BC0}" srcOrd="0" destOrd="0" presId="urn:microsoft.com/office/officeart/2008/layout/NameandTitleOrganizationalChart"/>
-    <dgm:cxn modelId="{654F570A-DC16-4BA1-B927-60F400D11492}" srcId="{E36A11BC-95B9-4DEF-ADF2-FDEBF22C9DB0}" destId="{37A510EB-8119-4716-B62D-15DF8D93BA1C}" srcOrd="1" destOrd="0" parTransId="{6C2C4623-8698-4C30-AEE6-88A183DF427B}" sibTransId="{E7B05799-F9D7-4F33-9CC0-62439E0422E7}"/>
-    <dgm:cxn modelId="{4D579EF4-5B4A-4D25-A816-115F8F3B7033}" type="presOf" srcId="{4E5BA817-AC97-4F63-84AA-A233E9052D5D}" destId="{9511BFAD-1414-4734-B169-295F9C7F487D}" srcOrd="1" destOrd="0" presId="urn:microsoft.com/office/officeart/2008/layout/NameandTitleOrganizationalChart"/>
-    <dgm:cxn modelId="{E51CCBCA-BAB1-4013-BA40-6E7E5C656138}" type="presOf" srcId="{FFB2719B-D077-4131-918A-013260B29988}" destId="{BB4C7695-3D4F-4AD8-A4C8-88433B609225}" srcOrd="0" destOrd="0" presId="urn:microsoft.com/office/officeart/2008/layout/NameandTitleOrganizationalChart"/>
-    <dgm:cxn modelId="{FB8F97E1-04D1-4749-AE69-1F2D91EFD498}" type="presOf" srcId="{F8E54155-6523-4925-A9E4-834A8DC67A18}" destId="{17119D8E-85D2-4DED-93E2-F1CD01D75E22}" srcOrd="1" destOrd="0" presId="urn:microsoft.com/office/officeart/2008/layout/NameandTitleOrganizationalChart"/>
-    <dgm:cxn modelId="{F0803CD7-2D60-49F7-844C-8DCD003ADC86}" type="presOf" srcId="{D09BB324-C6FD-4553-A418-F732954B5494}" destId="{7D5E766A-4DB9-4964-8B59-CD59CD85DAE3}" srcOrd="0" destOrd="0" presId="urn:microsoft.com/office/officeart/2008/layout/NameandTitleOrganizationalChart"/>
-    <dgm:cxn modelId="{B18ABA33-CC3C-4741-BE5A-325A467F0634}" type="presOf" srcId="{504249E1-525A-440D-A9BF-3D6F8BB356A5}" destId="{6F36E42C-B850-4B8C-8E19-BC163F33D641}" srcOrd="0" destOrd="0" presId="urn:microsoft.com/office/officeart/2008/layout/NameandTitleOrganizationalChart"/>
-    <dgm:cxn modelId="{92CBB0E5-C3CB-43DC-9668-AB90A5AA1D92}" type="presOf" srcId="{E7B05799-F9D7-4F33-9CC0-62439E0422E7}" destId="{9CF88F62-A2FA-4526-B9F3-259E100D1115}" srcOrd="0" destOrd="0" presId="urn:microsoft.com/office/officeart/2008/layout/NameandTitleOrganizationalChart"/>
-    <dgm:cxn modelId="{938E23C6-CB73-4F13-AE5B-0BF0691DD504}" type="presOf" srcId="{AC36920A-769F-49AD-BBFB-2968F96B38A7}" destId="{5EAA5B17-6968-42F3-AC29-EB4D37A60556}" srcOrd="0" destOrd="0" presId="urn:microsoft.com/office/officeart/2008/layout/NameandTitleOrganizationalChart"/>
-    <dgm:cxn modelId="{F2B90FD1-661A-4FBE-8D82-B5CFFF846A23}" srcId="{E36A11BC-95B9-4DEF-ADF2-FDEBF22C9DB0}" destId="{89E13DF5-B5EB-4AB0-9B4C-A80AECD0527B}" srcOrd="2" destOrd="0" parTransId="{504249E1-525A-440D-A9BF-3D6F8BB356A5}" sibTransId="{9875196B-DB6E-4D70-BD5B-3794611CDB61}"/>
-    <dgm:cxn modelId="{17E1733E-AFA9-4D69-9F53-4D249436BD9E}" type="presOf" srcId="{89E13DF5-B5EB-4AB0-9B4C-A80AECD0527B}" destId="{A35B4B67-CB2F-4AB9-AD78-E5DD5295D98C}" srcOrd="1" destOrd="0" presId="urn:microsoft.com/office/officeart/2008/layout/NameandTitleOrganizationalChart"/>
     <dgm:cxn modelId="{543EC84C-A3AC-4345-8626-04A980B23514}" type="presParOf" srcId="{DA011C9A-CE82-4181-8F5B-6933F790B94F}" destId="{C18D6CCE-3B8E-4A01-9A44-43F770E57B90}" srcOrd="0" destOrd="0" presId="urn:microsoft.com/office/officeart/2008/layout/NameandTitleOrganizationalChart"/>
     <dgm:cxn modelId="{8AC18DD3-5B20-4979-83BA-D418F224AAFD}" type="presParOf" srcId="{C18D6CCE-3B8E-4A01-9A44-43F770E57B90}" destId="{6A9AC11E-15D4-4445-B8D0-DCB01571311A}" srcOrd="0" destOrd="0" presId="urn:microsoft.com/office/officeart/2008/layout/NameandTitleOrganizationalChart"/>
     <dgm:cxn modelId="{BAB22918-A388-45DD-AEC8-25E5851C5B8A}" type="presParOf" srcId="{6A9AC11E-15D4-4445-B8D0-DCB01571311A}" destId="{7D5E766A-4DB9-4964-8B59-CD59CD85DAE3}" srcOrd="0" destOrd="0" presId="urn:microsoft.com/office/officeart/2008/layout/NameandTitleOrganizationalChart"/>
@@ -15430,7 +15431,7 @@
         <p:spPr>
           <a:xfrm>
             <a:off x="1430563" y="881743"/>
-            <a:ext cx="9003394" cy="3139321"/>
+            <a:ext cx="9003394" cy="2677656"/>
           </a:xfrm>
           <a:prstGeom prst="rect">
             <a:avLst/>
@@ -15549,14 +15550,12 @@
             </a:r>
             <a:r>
               <a:rPr lang="tr-TR" sz="1500" dirty="0" smtClean="0"/>
-              <a:t>	Makalenin paylaşıldığı yer</a:t>
-            </a:r>
-          </a:p>
-          <a:p>
-            <a:pPr lvl="0"/>
-            <a:endParaRPr lang="tr-TR" sz="1500" dirty="0" smtClean="0"/>
-          </a:p>
-          <a:p>
+              <a:t>	Makalenin paylaşıldığı </a:t>
+            </a:r>
+            <a:r>
+              <a:rPr lang="tr-TR" sz="1500" dirty="0" smtClean="0"/>
+              <a:t>yer</a:t>
+            </a:r>
             <a:endParaRPr lang="tr-TR" sz="1500" dirty="0" smtClean="0"/>
           </a:p>
         </p:txBody>
@@ -15571,6 +15570,1922 @@
   <p:clrMapOvr>
     <a:masterClrMapping/>
   </p:clrMapOvr>
+  <p:timing>
+    <p:tnLst>
+      <p:par>
+        <p:cTn id="1" dur="indefinite" restart="never" nodeType="tmRoot"/>
+      </p:par>
+    </p:tnLst>
+  </p:timing>
+</p:sld>
+</file>
+
+<file path=ppt/slides/slide7.xml><?xml version="1.0" encoding="utf-8"?>
+<p:sld xmlns:a="http://schemas.openxmlformats.org/drawingml/2006/main" xmlns:r="http://schemas.openxmlformats.org/officeDocument/2006/relationships" xmlns:p="http://schemas.openxmlformats.org/presentationml/2006/main">
+  <p:cSld>
+    <p:spTree>
+      <p:nvGrpSpPr>
+        <p:cNvPr id="1" name=""/>
+        <p:cNvGrpSpPr/>
+        <p:nvPr/>
+      </p:nvGrpSpPr>
+      <p:grpSpPr>
+        <a:xfrm>
+          <a:off x="0" y="0"/>
+          <a:ext cx="0" cy="0"/>
+          <a:chOff x="0" y="0"/>
+          <a:chExt cx="0" cy="0"/>
+        </a:xfrm>
+      </p:grpSpPr>
+      <p:sp>
+        <p:nvSpPr>
+          <p:cNvPr id="2" name="Başlık 1"/>
+          <p:cNvSpPr>
+            <a:spLocks noGrp="1"/>
+          </p:cNvSpPr>
+          <p:nvPr>
+            <p:ph type="title"/>
+          </p:nvPr>
+        </p:nvSpPr>
+        <p:spPr/>
+        <p:txBody>
+          <a:bodyPr/>
+          <a:lstStyle/>
+          <a:p>
+            <a:r>
+              <a:rPr lang="tr-TR" dirty="0" smtClean="0"/>
+              <a:t>Genel IPO</a:t>
+            </a:r>
+            <a:endParaRPr lang="tr-TR" dirty="0"/>
+          </a:p>
+        </p:txBody>
+      </p:sp>
+      <p:grpSp>
+        <p:nvGrpSpPr>
+          <p:cNvPr id="14" name="Grup 13"/>
+          <p:cNvGrpSpPr/>
+          <p:nvPr/>
+        </p:nvGrpSpPr>
+        <p:grpSpPr>
+          <a:xfrm>
+            <a:off x="815881" y="1153260"/>
+            <a:ext cx="9509558" cy="5324713"/>
+            <a:chOff x="2081346" y="1027975"/>
+            <a:chExt cx="8524607" cy="4773207"/>
+          </a:xfrm>
+        </p:grpSpPr>
+        <p:sp>
+          <p:nvSpPr>
+            <p:cNvPr id="22" name="Serbest Form 21"/>
+            <p:cNvSpPr/>
+            <p:nvPr/>
+          </p:nvSpPr>
+          <p:spPr>
+            <a:xfrm rot="16200000">
+              <a:off x="164205" y="3491763"/>
+              <a:ext cx="4226560" cy="392277"/>
+            </a:xfrm>
+            <a:custGeom>
+              <a:avLst/>
+              <a:gdLst>
+                <a:gd name="connsiteX0" fmla="*/ 0 w 4226560"/>
+                <a:gd name="connsiteY0" fmla="*/ 0 h 392277"/>
+                <a:gd name="connsiteX1" fmla="*/ 4226560 w 4226560"/>
+                <a:gd name="connsiteY1" fmla="*/ 0 h 392277"/>
+                <a:gd name="connsiteX2" fmla="*/ 4226560 w 4226560"/>
+                <a:gd name="connsiteY2" fmla="*/ 392277 h 392277"/>
+                <a:gd name="connsiteX3" fmla="*/ 0 w 4226560"/>
+                <a:gd name="connsiteY3" fmla="*/ 392277 h 392277"/>
+                <a:gd name="connsiteX4" fmla="*/ 0 w 4226560"/>
+                <a:gd name="connsiteY4" fmla="*/ 0 h 392277"/>
+              </a:gdLst>
+              <a:ahLst/>
+              <a:cxnLst>
+                <a:cxn ang="0">
+                  <a:pos x="connsiteX0" y="connsiteY0"/>
+                </a:cxn>
+                <a:cxn ang="0">
+                  <a:pos x="connsiteX1" y="connsiteY1"/>
+                </a:cxn>
+                <a:cxn ang="0">
+                  <a:pos x="connsiteX2" y="connsiteY2"/>
+                </a:cxn>
+                <a:cxn ang="0">
+                  <a:pos x="connsiteX3" y="connsiteY3"/>
+                </a:cxn>
+                <a:cxn ang="0">
+                  <a:pos x="connsiteX4" y="connsiteY4"/>
+                </a:cxn>
+              </a:cxnLst>
+              <a:rect l="l" t="t" r="r" b="b"/>
+              <a:pathLst>
+                <a:path w="4226560" h="392277">
+                  <a:moveTo>
+                    <a:pt x="0" y="0"/>
+                  </a:moveTo>
+                  <a:lnTo>
+                    <a:pt x="4226560" y="0"/>
+                  </a:lnTo>
+                  <a:lnTo>
+                    <a:pt x="4226560" y="392277"/>
+                  </a:lnTo>
+                  <a:lnTo>
+                    <a:pt x="0" y="392277"/>
+                  </a:lnTo>
+                  <a:lnTo>
+                    <a:pt x="0" y="0"/>
+                  </a:lnTo>
+                  <a:close/>
+                </a:path>
+              </a:pathLst>
+            </a:custGeom>
+          </p:spPr>
+          <p:style>
+            <a:lnRef idx="0">
+              <a:schemeClr val="dk1">
+                <a:alpha val="0"/>
+                <a:hueOff val="0"/>
+                <a:satOff val="0"/>
+                <a:lumOff val="0"/>
+                <a:alphaOff val="0"/>
+              </a:schemeClr>
+            </a:lnRef>
+            <a:fillRef idx="0">
+              <a:schemeClr val="lt1">
+                <a:alpha val="0"/>
+                <a:hueOff val="0"/>
+                <a:satOff val="0"/>
+                <a:lumOff val="0"/>
+                <a:alphaOff val="0"/>
+              </a:schemeClr>
+            </a:fillRef>
+            <a:effectRef idx="0">
+              <a:schemeClr val="lt1">
+                <a:alpha val="0"/>
+                <a:hueOff val="0"/>
+                <a:satOff val="0"/>
+                <a:lumOff val="0"/>
+                <a:alphaOff val="0"/>
+              </a:schemeClr>
+            </a:effectRef>
+            <a:fontRef idx="minor">
+              <a:schemeClr val="tx1">
+                <a:hueOff val="0"/>
+                <a:satOff val="0"/>
+                <a:lumOff val="0"/>
+                <a:alphaOff val="0"/>
+              </a:schemeClr>
+            </a:fontRef>
+          </p:style>
+          <p:txBody>
+            <a:bodyPr spcFirstLastPara="0" vert="horz" wrap="square" lIns="-1" tIns="-1" rIns="345967" bIns="0" numCol="1" spcCol="1270" anchor="t" anchorCtr="0">
+              <a:noAutofit/>
+            </a:bodyPr>
+            <a:lstStyle/>
+            <a:p>
+              <a:pPr lvl="0" algn="r" defTabSz="1200150">
+                <a:lnSpc>
+                  <a:spcPct val="90000"/>
+                </a:lnSpc>
+                <a:spcBef>
+                  <a:spcPct val="0"/>
+                </a:spcBef>
+                <a:spcAft>
+                  <a:spcPct val="35000"/>
+                </a:spcAft>
+              </a:pPr>
+              <a:endParaRPr lang="tr-TR" sz="2700" kern="1200"/>
+            </a:p>
+          </p:txBody>
+        </p:sp>
+        <p:sp>
+          <p:nvSpPr>
+            <p:cNvPr id="23" name="Serbest Form 22"/>
+            <p:cNvSpPr/>
+            <p:nvPr/>
+          </p:nvSpPr>
+          <p:spPr>
+            <a:xfrm>
+              <a:off x="2473622" y="1574622"/>
+              <a:ext cx="2449259" cy="3762172"/>
+            </a:xfrm>
+            <a:custGeom>
+              <a:avLst/>
+              <a:gdLst>
+                <a:gd name="connsiteX0" fmla="*/ 0 w 1953958"/>
+                <a:gd name="connsiteY0" fmla="*/ 0 h 4226560"/>
+                <a:gd name="connsiteX1" fmla="*/ 1953958 w 1953958"/>
+                <a:gd name="connsiteY1" fmla="*/ 0 h 4226560"/>
+                <a:gd name="connsiteX2" fmla="*/ 1953958 w 1953958"/>
+                <a:gd name="connsiteY2" fmla="*/ 4226560 h 4226560"/>
+                <a:gd name="connsiteX3" fmla="*/ 0 w 1953958"/>
+                <a:gd name="connsiteY3" fmla="*/ 4226560 h 4226560"/>
+                <a:gd name="connsiteX4" fmla="*/ 0 w 1953958"/>
+                <a:gd name="connsiteY4" fmla="*/ 0 h 4226560"/>
+              </a:gdLst>
+              <a:ahLst/>
+              <a:cxnLst>
+                <a:cxn ang="0">
+                  <a:pos x="connsiteX0" y="connsiteY0"/>
+                </a:cxn>
+                <a:cxn ang="0">
+                  <a:pos x="connsiteX1" y="connsiteY1"/>
+                </a:cxn>
+                <a:cxn ang="0">
+                  <a:pos x="connsiteX2" y="connsiteY2"/>
+                </a:cxn>
+                <a:cxn ang="0">
+                  <a:pos x="connsiteX3" y="connsiteY3"/>
+                </a:cxn>
+                <a:cxn ang="0">
+                  <a:pos x="connsiteX4" y="connsiteY4"/>
+                </a:cxn>
+              </a:cxnLst>
+              <a:rect l="l" t="t" r="r" b="b"/>
+              <a:pathLst>
+                <a:path w="1953958" h="4226560">
+                  <a:moveTo>
+                    <a:pt x="0" y="0"/>
+                  </a:moveTo>
+                  <a:lnTo>
+                    <a:pt x="1953958" y="0"/>
+                  </a:lnTo>
+                  <a:lnTo>
+                    <a:pt x="1953958" y="4226560"/>
+                  </a:lnTo>
+                  <a:lnTo>
+                    <a:pt x="0" y="4226560"/>
+                  </a:lnTo>
+                  <a:lnTo>
+                    <a:pt x="0" y="0"/>
+                  </a:lnTo>
+                  <a:close/>
+                </a:path>
+              </a:pathLst>
+            </a:custGeom>
+          </p:spPr>
+          <p:style>
+            <a:lnRef idx="2">
+              <a:schemeClr val="lt1">
+                <a:hueOff val="0"/>
+                <a:satOff val="0"/>
+                <a:lumOff val="0"/>
+                <a:alphaOff val="0"/>
+              </a:schemeClr>
+            </a:lnRef>
+            <a:fillRef idx="1">
+              <a:schemeClr val="accent1">
+                <a:hueOff val="0"/>
+                <a:satOff val="0"/>
+                <a:lumOff val="0"/>
+                <a:alphaOff val="0"/>
+              </a:schemeClr>
+            </a:fillRef>
+            <a:effectRef idx="0">
+              <a:schemeClr val="accent1">
+                <a:hueOff val="0"/>
+                <a:satOff val="0"/>
+                <a:lumOff val="0"/>
+                <a:alphaOff val="0"/>
+              </a:schemeClr>
+            </a:effectRef>
+            <a:fontRef idx="minor">
+              <a:schemeClr val="lt1"/>
+            </a:fontRef>
+          </p:style>
+          <p:txBody>
+            <a:bodyPr spcFirstLastPara="0" vert="horz" wrap="square" lIns="248920" tIns="345967" rIns="248920" bIns="248920" numCol="1" spcCol="1270" anchor="t" anchorCtr="0">
+              <a:noAutofit/>
+            </a:bodyPr>
+            <a:lstStyle/>
+            <a:p>
+              <a:pPr marL="228600" lvl="1" indent="-228600" algn="l" defTabSz="1200150">
+                <a:lnSpc>
+                  <a:spcPct val="90000"/>
+                </a:lnSpc>
+                <a:spcBef>
+                  <a:spcPct val="0"/>
+                </a:spcBef>
+                <a:spcAft>
+                  <a:spcPct val="15000"/>
+                </a:spcAft>
+                <a:buChar char="••"/>
+              </a:pPr>
+              <a:r>
+                <a:rPr lang="tr-TR" sz="1200" kern="1200" dirty="0" smtClean="0"/>
+                <a:t>Tablolar</a:t>
+              </a:r>
+            </a:p>
+            <a:p>
+              <a:pPr marL="685800" lvl="2" indent="-228600" defTabSz="1200150">
+                <a:lnSpc>
+                  <a:spcPct val="90000"/>
+                </a:lnSpc>
+                <a:spcBef>
+                  <a:spcPct val="0"/>
+                </a:spcBef>
+                <a:spcAft>
+                  <a:spcPct val="15000"/>
+                </a:spcAft>
+                <a:buChar char="••"/>
+              </a:pPr>
+              <a:r>
+                <a:rPr lang="tr-TR" sz="1200" dirty="0" err="1"/>
+                <a:t>w</a:t>
+              </a:r>
+              <a:r>
+                <a:rPr lang="tr-TR" sz="1200" dirty="0" err="1" smtClean="0"/>
+                <a:t>p_posts</a:t>
+              </a:r>
+              <a:endParaRPr lang="tr-TR" sz="1200" dirty="0" smtClean="0"/>
+            </a:p>
+            <a:p>
+              <a:pPr marL="685800" lvl="2" indent="-228600" defTabSz="1200150">
+                <a:lnSpc>
+                  <a:spcPct val="90000"/>
+                </a:lnSpc>
+                <a:spcBef>
+                  <a:spcPct val="0"/>
+                </a:spcBef>
+                <a:spcAft>
+                  <a:spcPct val="15000"/>
+                </a:spcAft>
+                <a:buChar char="••"/>
+              </a:pPr>
+              <a:r>
+                <a:rPr lang="tr-TR" sz="1200" dirty="0" err="1"/>
+                <a:t>w</a:t>
+              </a:r>
+              <a:r>
+                <a:rPr lang="tr-TR" sz="1200" kern="1200" dirty="0" err="1" smtClean="0"/>
+                <a:t>p_postmeta</a:t>
+              </a:r>
+              <a:endParaRPr lang="tr-TR" sz="1200" kern="1200" dirty="0" smtClean="0"/>
+            </a:p>
+            <a:p>
+              <a:pPr marL="685800" lvl="2" indent="-228600" defTabSz="1200150">
+                <a:lnSpc>
+                  <a:spcPct val="90000"/>
+                </a:lnSpc>
+                <a:spcBef>
+                  <a:spcPct val="0"/>
+                </a:spcBef>
+                <a:spcAft>
+                  <a:spcPct val="15000"/>
+                </a:spcAft>
+                <a:buChar char="••"/>
+              </a:pPr>
+              <a:r>
+                <a:rPr lang="tr-TR" sz="1200" dirty="0" err="1"/>
+                <a:t>w</a:t>
+              </a:r>
+              <a:r>
+                <a:rPr lang="tr-TR" sz="1200" kern="1200" dirty="0" err="1" smtClean="0"/>
+                <a:t>p</a:t>
+              </a:r>
+              <a:r>
+                <a:rPr lang="tr-TR" sz="1200" dirty="0" err="1" smtClean="0"/>
+                <a:t>_users</a:t>
+              </a:r>
+              <a:endParaRPr lang="tr-TR" sz="1200" dirty="0" smtClean="0"/>
+            </a:p>
+            <a:p>
+              <a:pPr marL="685800" lvl="2" indent="-228600" defTabSz="1200150">
+                <a:lnSpc>
+                  <a:spcPct val="90000"/>
+                </a:lnSpc>
+                <a:spcBef>
+                  <a:spcPct val="0"/>
+                </a:spcBef>
+                <a:spcAft>
+                  <a:spcPct val="15000"/>
+                </a:spcAft>
+                <a:buChar char="••"/>
+              </a:pPr>
+              <a:r>
+                <a:rPr lang="tr-TR" sz="1200" dirty="0" err="1"/>
+                <a:t>w</a:t>
+              </a:r>
+              <a:r>
+                <a:rPr lang="tr-TR" sz="1200" kern="1200" dirty="0" err="1" smtClean="0"/>
+                <a:t>p_usermeta</a:t>
+              </a:r>
+              <a:endParaRPr lang="tr-TR" sz="1200" kern="1200" dirty="0" smtClean="0"/>
+            </a:p>
+            <a:p>
+              <a:pPr marL="685800" lvl="2" indent="-228600" defTabSz="1200150">
+                <a:lnSpc>
+                  <a:spcPct val="90000"/>
+                </a:lnSpc>
+                <a:spcBef>
+                  <a:spcPct val="0"/>
+                </a:spcBef>
+                <a:spcAft>
+                  <a:spcPct val="15000"/>
+                </a:spcAft>
+                <a:buChar char="••"/>
+              </a:pPr>
+              <a:r>
+                <a:rPr lang="tr-TR" sz="1200" dirty="0" err="1" smtClean="0"/>
+                <a:t>wp_comments</a:t>
+              </a:r>
+              <a:endParaRPr lang="tr-TR" sz="1200" dirty="0" smtClean="0"/>
+            </a:p>
+            <a:p>
+              <a:pPr marL="685800" lvl="2" indent="-228600" defTabSz="1200150">
+                <a:lnSpc>
+                  <a:spcPct val="90000"/>
+                </a:lnSpc>
+                <a:spcBef>
+                  <a:spcPct val="0"/>
+                </a:spcBef>
+                <a:spcAft>
+                  <a:spcPct val="15000"/>
+                </a:spcAft>
+                <a:buChar char="••"/>
+              </a:pPr>
+              <a:r>
+                <a:rPr lang="tr-TR" sz="1200" kern="1200" dirty="0" err="1" smtClean="0"/>
+                <a:t>wp_commentmeta</a:t>
+              </a:r>
+              <a:endParaRPr lang="tr-TR" sz="1200" kern="1200" dirty="0"/>
+            </a:p>
+            <a:p>
+              <a:pPr marL="228600" lvl="1" indent="-228600" algn="l" defTabSz="1200150">
+                <a:lnSpc>
+                  <a:spcPct val="90000"/>
+                </a:lnSpc>
+                <a:spcBef>
+                  <a:spcPct val="0"/>
+                </a:spcBef>
+                <a:spcAft>
+                  <a:spcPct val="15000"/>
+                </a:spcAft>
+                <a:buChar char="••"/>
+              </a:pPr>
+              <a:endParaRPr lang="tr-TR" sz="1200" kern="1200" dirty="0" smtClean="0"/>
+            </a:p>
+            <a:p>
+              <a:pPr marL="228600" lvl="1" indent="-228600" algn="l" defTabSz="1200150">
+                <a:lnSpc>
+                  <a:spcPct val="90000"/>
+                </a:lnSpc>
+                <a:spcBef>
+                  <a:spcPct val="0"/>
+                </a:spcBef>
+                <a:spcAft>
+                  <a:spcPct val="15000"/>
+                </a:spcAft>
+                <a:buChar char="••"/>
+              </a:pPr>
+              <a:r>
+                <a:rPr lang="tr-TR" sz="1200" kern="1200" dirty="0" smtClean="0"/>
+                <a:t>Kullanıcı Girişi</a:t>
+              </a:r>
+              <a:endParaRPr lang="tr-TR" sz="1200" kern="1200" dirty="0"/>
+            </a:p>
+          </p:txBody>
+        </p:sp>
+        <p:sp>
+          <p:nvSpPr>
+            <p:cNvPr id="24" name="Dikdörtgen 23"/>
+            <p:cNvSpPr/>
+            <p:nvPr/>
+          </p:nvSpPr>
+          <p:spPr>
+            <a:xfrm>
+              <a:off x="2856956" y="1027975"/>
+              <a:ext cx="1037047" cy="392277"/>
+            </a:xfrm>
+            <a:prstGeom prst="rect">
+              <a:avLst/>
+            </a:prstGeom>
+          </p:spPr>
+          <p:style>
+            <a:lnRef idx="2">
+              <a:schemeClr val="lt1">
+                <a:hueOff val="0"/>
+                <a:satOff val="0"/>
+                <a:lumOff val="0"/>
+                <a:alphaOff val="0"/>
+              </a:schemeClr>
+            </a:lnRef>
+            <a:fillRef idx="1">
+              <a:schemeClr val="accent1">
+                <a:tint val="50000"/>
+                <a:hueOff val="0"/>
+                <a:satOff val="0"/>
+                <a:lumOff val="0"/>
+                <a:alphaOff val="0"/>
+              </a:schemeClr>
+            </a:fillRef>
+            <a:effectRef idx="0">
+              <a:schemeClr val="accent1">
+                <a:tint val="50000"/>
+                <a:hueOff val="0"/>
+                <a:satOff val="0"/>
+                <a:lumOff val="0"/>
+                <a:alphaOff val="0"/>
+              </a:schemeClr>
+            </a:effectRef>
+            <a:fontRef idx="minor">
+              <a:schemeClr val="lt1">
+                <a:hueOff val="0"/>
+                <a:satOff val="0"/>
+                <a:lumOff val="0"/>
+                <a:alphaOff val="0"/>
+              </a:schemeClr>
+            </a:fontRef>
+          </p:style>
+          <p:txBody>
+            <a:bodyPr/>
+            <a:lstStyle/>
+            <a:p>
+              <a:pPr algn="ctr"/>
+              <a:r>
+                <a:rPr lang="tr-TR" dirty="0" err="1" smtClean="0"/>
+                <a:t>Input</a:t>
+              </a:r>
+              <a:endParaRPr lang="tr-TR" dirty="0"/>
+            </a:p>
+          </p:txBody>
+        </p:sp>
+        <p:sp>
+          <p:nvSpPr>
+            <p:cNvPr id="25" name="Serbest Form 24"/>
+            <p:cNvSpPr/>
+            <p:nvPr/>
+          </p:nvSpPr>
+          <p:spPr>
+            <a:xfrm rot="16200000">
+              <a:off x="3005740" y="3491763"/>
+              <a:ext cx="4226560" cy="392277"/>
+            </a:xfrm>
+            <a:custGeom>
+              <a:avLst/>
+              <a:gdLst>
+                <a:gd name="connsiteX0" fmla="*/ 0 w 4226560"/>
+                <a:gd name="connsiteY0" fmla="*/ 0 h 392277"/>
+                <a:gd name="connsiteX1" fmla="*/ 4226560 w 4226560"/>
+                <a:gd name="connsiteY1" fmla="*/ 0 h 392277"/>
+                <a:gd name="connsiteX2" fmla="*/ 4226560 w 4226560"/>
+                <a:gd name="connsiteY2" fmla="*/ 392277 h 392277"/>
+                <a:gd name="connsiteX3" fmla="*/ 0 w 4226560"/>
+                <a:gd name="connsiteY3" fmla="*/ 392277 h 392277"/>
+                <a:gd name="connsiteX4" fmla="*/ 0 w 4226560"/>
+                <a:gd name="connsiteY4" fmla="*/ 0 h 392277"/>
+              </a:gdLst>
+              <a:ahLst/>
+              <a:cxnLst>
+                <a:cxn ang="0">
+                  <a:pos x="connsiteX0" y="connsiteY0"/>
+                </a:cxn>
+                <a:cxn ang="0">
+                  <a:pos x="connsiteX1" y="connsiteY1"/>
+                </a:cxn>
+                <a:cxn ang="0">
+                  <a:pos x="connsiteX2" y="connsiteY2"/>
+                </a:cxn>
+                <a:cxn ang="0">
+                  <a:pos x="connsiteX3" y="connsiteY3"/>
+                </a:cxn>
+                <a:cxn ang="0">
+                  <a:pos x="connsiteX4" y="connsiteY4"/>
+                </a:cxn>
+              </a:cxnLst>
+              <a:rect l="l" t="t" r="r" b="b"/>
+              <a:pathLst>
+                <a:path w="4226560" h="392277">
+                  <a:moveTo>
+                    <a:pt x="0" y="0"/>
+                  </a:moveTo>
+                  <a:lnTo>
+                    <a:pt x="4226560" y="0"/>
+                  </a:lnTo>
+                  <a:lnTo>
+                    <a:pt x="4226560" y="392277"/>
+                  </a:lnTo>
+                  <a:lnTo>
+                    <a:pt x="0" y="392277"/>
+                  </a:lnTo>
+                  <a:lnTo>
+                    <a:pt x="0" y="0"/>
+                  </a:lnTo>
+                  <a:close/>
+                </a:path>
+              </a:pathLst>
+            </a:custGeom>
+          </p:spPr>
+          <p:style>
+            <a:lnRef idx="0">
+              <a:schemeClr val="dk1">
+                <a:alpha val="0"/>
+                <a:hueOff val="0"/>
+                <a:satOff val="0"/>
+                <a:lumOff val="0"/>
+                <a:alphaOff val="0"/>
+              </a:schemeClr>
+            </a:lnRef>
+            <a:fillRef idx="0">
+              <a:schemeClr val="lt1">
+                <a:alpha val="0"/>
+                <a:hueOff val="0"/>
+                <a:satOff val="0"/>
+                <a:lumOff val="0"/>
+                <a:alphaOff val="0"/>
+              </a:schemeClr>
+            </a:fillRef>
+            <a:effectRef idx="0">
+              <a:schemeClr val="lt1">
+                <a:alpha val="0"/>
+                <a:hueOff val="0"/>
+                <a:satOff val="0"/>
+                <a:lumOff val="0"/>
+                <a:alphaOff val="0"/>
+              </a:schemeClr>
+            </a:effectRef>
+            <a:fontRef idx="minor">
+              <a:schemeClr val="tx1">
+                <a:hueOff val="0"/>
+                <a:satOff val="0"/>
+                <a:lumOff val="0"/>
+                <a:alphaOff val="0"/>
+              </a:schemeClr>
+            </a:fontRef>
+          </p:style>
+          <p:txBody>
+            <a:bodyPr spcFirstLastPara="0" vert="horz" wrap="square" lIns="-1" tIns="-1" rIns="345967" bIns="0" numCol="1" spcCol="1270" anchor="t" anchorCtr="0">
+              <a:noAutofit/>
+            </a:bodyPr>
+            <a:lstStyle/>
+            <a:p>
+              <a:pPr lvl="0" algn="r" defTabSz="1200150">
+                <a:lnSpc>
+                  <a:spcPct val="90000"/>
+                </a:lnSpc>
+                <a:spcBef>
+                  <a:spcPct val="0"/>
+                </a:spcBef>
+                <a:spcAft>
+                  <a:spcPct val="35000"/>
+                </a:spcAft>
+              </a:pPr>
+              <a:endParaRPr lang="tr-TR" sz="2700" kern="1200"/>
+            </a:p>
+          </p:txBody>
+        </p:sp>
+        <p:sp>
+          <p:nvSpPr>
+            <p:cNvPr id="26" name="Serbest Form 25"/>
+            <p:cNvSpPr/>
+            <p:nvPr/>
+          </p:nvSpPr>
+          <p:spPr>
+            <a:xfrm>
+              <a:off x="5315158" y="1574622"/>
+              <a:ext cx="2449259" cy="3762172"/>
+            </a:xfrm>
+            <a:custGeom>
+              <a:avLst/>
+              <a:gdLst>
+                <a:gd name="connsiteX0" fmla="*/ 0 w 1953958"/>
+                <a:gd name="connsiteY0" fmla="*/ 0 h 4226560"/>
+                <a:gd name="connsiteX1" fmla="*/ 1953958 w 1953958"/>
+                <a:gd name="connsiteY1" fmla="*/ 0 h 4226560"/>
+                <a:gd name="connsiteX2" fmla="*/ 1953958 w 1953958"/>
+                <a:gd name="connsiteY2" fmla="*/ 4226560 h 4226560"/>
+                <a:gd name="connsiteX3" fmla="*/ 0 w 1953958"/>
+                <a:gd name="connsiteY3" fmla="*/ 4226560 h 4226560"/>
+                <a:gd name="connsiteX4" fmla="*/ 0 w 1953958"/>
+                <a:gd name="connsiteY4" fmla="*/ 0 h 4226560"/>
+              </a:gdLst>
+              <a:ahLst/>
+              <a:cxnLst>
+                <a:cxn ang="0">
+                  <a:pos x="connsiteX0" y="connsiteY0"/>
+                </a:cxn>
+                <a:cxn ang="0">
+                  <a:pos x="connsiteX1" y="connsiteY1"/>
+                </a:cxn>
+                <a:cxn ang="0">
+                  <a:pos x="connsiteX2" y="connsiteY2"/>
+                </a:cxn>
+                <a:cxn ang="0">
+                  <a:pos x="connsiteX3" y="connsiteY3"/>
+                </a:cxn>
+                <a:cxn ang="0">
+                  <a:pos x="connsiteX4" y="connsiteY4"/>
+                </a:cxn>
+              </a:cxnLst>
+              <a:rect l="l" t="t" r="r" b="b"/>
+              <a:pathLst>
+                <a:path w="1953958" h="4226560">
+                  <a:moveTo>
+                    <a:pt x="0" y="0"/>
+                  </a:moveTo>
+                  <a:lnTo>
+                    <a:pt x="1953958" y="0"/>
+                  </a:lnTo>
+                  <a:lnTo>
+                    <a:pt x="1953958" y="4226560"/>
+                  </a:lnTo>
+                  <a:lnTo>
+                    <a:pt x="0" y="4226560"/>
+                  </a:lnTo>
+                  <a:lnTo>
+                    <a:pt x="0" y="0"/>
+                  </a:lnTo>
+                  <a:close/>
+                </a:path>
+              </a:pathLst>
+            </a:custGeom>
+          </p:spPr>
+          <p:style>
+            <a:lnRef idx="2">
+              <a:schemeClr val="lt1">
+                <a:hueOff val="0"/>
+                <a:satOff val="0"/>
+                <a:lumOff val="0"/>
+                <a:alphaOff val="0"/>
+              </a:schemeClr>
+            </a:lnRef>
+            <a:fillRef idx="1">
+              <a:schemeClr val="accent1">
+                <a:hueOff val="0"/>
+                <a:satOff val="0"/>
+                <a:lumOff val="0"/>
+                <a:alphaOff val="0"/>
+              </a:schemeClr>
+            </a:fillRef>
+            <a:effectRef idx="0">
+              <a:schemeClr val="accent1">
+                <a:hueOff val="0"/>
+                <a:satOff val="0"/>
+                <a:lumOff val="0"/>
+                <a:alphaOff val="0"/>
+              </a:schemeClr>
+            </a:effectRef>
+            <a:fontRef idx="minor">
+              <a:schemeClr val="lt1"/>
+            </a:fontRef>
+          </p:style>
+          <p:txBody>
+            <a:bodyPr spcFirstLastPara="0" vert="horz" wrap="square" lIns="248920" tIns="345967" rIns="248920" bIns="248920" numCol="1" spcCol="1270" anchor="t" anchorCtr="0">
+              <a:noAutofit/>
+            </a:bodyPr>
+            <a:lstStyle/>
+            <a:p>
+              <a:pPr marL="457200" lvl="2" defTabSz="1200150">
+                <a:lnSpc>
+                  <a:spcPct val="90000"/>
+                </a:lnSpc>
+                <a:spcBef>
+                  <a:spcPct val="0"/>
+                </a:spcBef>
+                <a:spcAft>
+                  <a:spcPct val="15000"/>
+                </a:spcAft>
+              </a:pPr>
+              <a:r>
+                <a:rPr lang="tr-TR" sz="1200" dirty="0" smtClean="0"/>
+                <a:t>Yönetici</a:t>
+              </a:r>
+            </a:p>
+            <a:p>
+              <a:pPr marL="457200" lvl="2" defTabSz="1200150">
+                <a:lnSpc>
+                  <a:spcPct val="90000"/>
+                </a:lnSpc>
+                <a:spcBef>
+                  <a:spcPct val="0"/>
+                </a:spcBef>
+                <a:spcAft>
+                  <a:spcPct val="15000"/>
+                </a:spcAft>
+              </a:pPr>
+              <a:endParaRPr lang="tr-TR" sz="1200" dirty="0"/>
+            </a:p>
+            <a:p>
+              <a:pPr marL="457200" lvl="2" defTabSz="1200150">
+                <a:lnSpc>
+                  <a:spcPct val="90000"/>
+                </a:lnSpc>
+                <a:spcBef>
+                  <a:spcPct val="0"/>
+                </a:spcBef>
+                <a:spcAft>
+                  <a:spcPct val="15000"/>
+                </a:spcAft>
+              </a:pPr>
+              <a:endParaRPr lang="tr-TR" sz="1200" dirty="0" smtClean="0"/>
+            </a:p>
+            <a:p>
+              <a:pPr marL="457200" lvl="2" defTabSz="1200150">
+                <a:lnSpc>
+                  <a:spcPct val="90000"/>
+                </a:lnSpc>
+                <a:spcBef>
+                  <a:spcPct val="0"/>
+                </a:spcBef>
+                <a:spcAft>
+                  <a:spcPct val="15000"/>
+                </a:spcAft>
+              </a:pPr>
+              <a:endParaRPr lang="tr-TR" sz="1200" dirty="0"/>
+            </a:p>
+            <a:p>
+              <a:pPr marL="457200" lvl="2" defTabSz="1200150">
+                <a:lnSpc>
+                  <a:spcPct val="90000"/>
+                </a:lnSpc>
+                <a:spcBef>
+                  <a:spcPct val="0"/>
+                </a:spcBef>
+                <a:spcAft>
+                  <a:spcPct val="15000"/>
+                </a:spcAft>
+              </a:pPr>
+              <a:endParaRPr lang="tr-TR" sz="1200" dirty="0" smtClean="0"/>
+            </a:p>
+            <a:p>
+              <a:pPr marL="457200" lvl="2" defTabSz="1200150">
+                <a:lnSpc>
+                  <a:spcPct val="90000"/>
+                </a:lnSpc>
+                <a:spcBef>
+                  <a:spcPct val="0"/>
+                </a:spcBef>
+                <a:spcAft>
+                  <a:spcPct val="15000"/>
+                </a:spcAft>
+              </a:pPr>
+              <a:endParaRPr lang="tr-TR" sz="1200" dirty="0"/>
+            </a:p>
+            <a:p>
+              <a:pPr marL="457200" lvl="2" defTabSz="1200150">
+                <a:lnSpc>
+                  <a:spcPct val="90000"/>
+                </a:lnSpc>
+                <a:spcBef>
+                  <a:spcPct val="0"/>
+                </a:spcBef>
+                <a:spcAft>
+                  <a:spcPct val="15000"/>
+                </a:spcAft>
+              </a:pPr>
+              <a:endParaRPr lang="tr-TR" sz="1200" dirty="0" smtClean="0"/>
+            </a:p>
+            <a:p>
+              <a:pPr marL="457200" lvl="2" defTabSz="1200150">
+                <a:lnSpc>
+                  <a:spcPct val="90000"/>
+                </a:lnSpc>
+                <a:spcBef>
+                  <a:spcPct val="0"/>
+                </a:spcBef>
+                <a:spcAft>
+                  <a:spcPct val="15000"/>
+                </a:spcAft>
+              </a:pPr>
+              <a:endParaRPr lang="tr-TR" sz="1200" dirty="0"/>
+            </a:p>
+            <a:p>
+              <a:pPr marL="457200" lvl="2" defTabSz="1200150">
+                <a:lnSpc>
+                  <a:spcPct val="90000"/>
+                </a:lnSpc>
+                <a:spcBef>
+                  <a:spcPct val="0"/>
+                </a:spcBef>
+                <a:spcAft>
+                  <a:spcPct val="15000"/>
+                </a:spcAft>
+              </a:pPr>
+              <a:endParaRPr lang="tr-TR" sz="1200" dirty="0" smtClean="0"/>
+            </a:p>
+            <a:p>
+              <a:pPr marL="457200" lvl="2" defTabSz="1200150">
+                <a:lnSpc>
+                  <a:spcPct val="90000"/>
+                </a:lnSpc>
+                <a:spcBef>
+                  <a:spcPct val="0"/>
+                </a:spcBef>
+                <a:spcAft>
+                  <a:spcPct val="15000"/>
+                </a:spcAft>
+              </a:pPr>
+              <a:endParaRPr lang="tr-TR" sz="1200" dirty="0"/>
+            </a:p>
+            <a:p>
+              <a:pPr marL="457200" lvl="2" defTabSz="1200150">
+                <a:lnSpc>
+                  <a:spcPct val="90000"/>
+                </a:lnSpc>
+                <a:spcBef>
+                  <a:spcPct val="0"/>
+                </a:spcBef>
+                <a:spcAft>
+                  <a:spcPct val="15000"/>
+                </a:spcAft>
+              </a:pPr>
+              <a:endParaRPr lang="tr-TR" sz="1200" dirty="0" smtClean="0"/>
+            </a:p>
+            <a:p>
+              <a:pPr marL="457200" lvl="2" defTabSz="1200150">
+                <a:lnSpc>
+                  <a:spcPct val="90000"/>
+                </a:lnSpc>
+                <a:spcBef>
+                  <a:spcPct val="0"/>
+                </a:spcBef>
+                <a:spcAft>
+                  <a:spcPct val="15000"/>
+                </a:spcAft>
+              </a:pPr>
+              <a:endParaRPr lang="tr-TR" sz="1200" dirty="0"/>
+            </a:p>
+            <a:p>
+              <a:pPr marL="457200" lvl="2" defTabSz="1200150">
+                <a:lnSpc>
+                  <a:spcPct val="90000"/>
+                </a:lnSpc>
+                <a:spcBef>
+                  <a:spcPct val="0"/>
+                </a:spcBef>
+                <a:spcAft>
+                  <a:spcPct val="15000"/>
+                </a:spcAft>
+              </a:pPr>
+              <a:endParaRPr lang="tr-TR" sz="1200" dirty="0"/>
+            </a:p>
+            <a:p>
+              <a:pPr marL="457200" lvl="2" defTabSz="1200150">
+                <a:lnSpc>
+                  <a:spcPct val="90000"/>
+                </a:lnSpc>
+                <a:spcBef>
+                  <a:spcPct val="0"/>
+                </a:spcBef>
+                <a:spcAft>
+                  <a:spcPct val="15000"/>
+                </a:spcAft>
+              </a:pPr>
+              <a:r>
+                <a:rPr lang="tr-TR" sz="1200" dirty="0" smtClean="0"/>
+                <a:t>Ziyaretçi</a:t>
+              </a:r>
+            </a:p>
+          </p:txBody>
+        </p:sp>
+        <p:sp>
+          <p:nvSpPr>
+            <p:cNvPr id="27" name="Dikdörtgen 26"/>
+            <p:cNvSpPr/>
+            <p:nvPr/>
+          </p:nvSpPr>
+          <p:spPr>
+            <a:xfrm>
+              <a:off x="5698492" y="1027975"/>
+              <a:ext cx="1037047" cy="392277"/>
+            </a:xfrm>
+            <a:prstGeom prst="rect">
+              <a:avLst/>
+            </a:prstGeom>
+          </p:spPr>
+          <p:style>
+            <a:lnRef idx="2">
+              <a:schemeClr val="lt1">
+                <a:hueOff val="0"/>
+                <a:satOff val="0"/>
+                <a:lumOff val="0"/>
+                <a:alphaOff val="0"/>
+              </a:schemeClr>
+            </a:lnRef>
+            <a:fillRef idx="1">
+              <a:schemeClr val="accent1">
+                <a:tint val="50000"/>
+                <a:hueOff val="0"/>
+                <a:satOff val="0"/>
+                <a:lumOff val="0"/>
+                <a:alphaOff val="0"/>
+              </a:schemeClr>
+            </a:fillRef>
+            <a:effectRef idx="0">
+              <a:schemeClr val="accent1">
+                <a:tint val="50000"/>
+                <a:hueOff val="0"/>
+                <a:satOff val="0"/>
+                <a:lumOff val="0"/>
+                <a:alphaOff val="0"/>
+              </a:schemeClr>
+            </a:effectRef>
+            <a:fontRef idx="minor">
+              <a:schemeClr val="lt1">
+                <a:hueOff val="0"/>
+                <a:satOff val="0"/>
+                <a:lumOff val="0"/>
+                <a:alphaOff val="0"/>
+              </a:schemeClr>
+            </a:fontRef>
+          </p:style>
+          <p:txBody>
+            <a:bodyPr/>
+            <a:lstStyle/>
+            <a:p>
+              <a:pPr algn="ctr"/>
+              <a:r>
+                <a:rPr lang="tr-TR" dirty="0" err="1" smtClean="0"/>
+                <a:t>Process</a:t>
+              </a:r>
+              <a:endParaRPr lang="tr-TR" dirty="0"/>
+            </a:p>
+          </p:txBody>
+        </p:sp>
+        <p:sp>
+          <p:nvSpPr>
+            <p:cNvPr id="28" name="Serbest Form 27"/>
+            <p:cNvSpPr/>
+            <p:nvPr/>
+          </p:nvSpPr>
+          <p:spPr>
+            <a:xfrm rot="16200000">
+              <a:off x="5847276" y="3491763"/>
+              <a:ext cx="4226560" cy="392277"/>
+            </a:xfrm>
+            <a:custGeom>
+              <a:avLst/>
+              <a:gdLst>
+                <a:gd name="connsiteX0" fmla="*/ 0 w 4226560"/>
+                <a:gd name="connsiteY0" fmla="*/ 0 h 392277"/>
+                <a:gd name="connsiteX1" fmla="*/ 4226560 w 4226560"/>
+                <a:gd name="connsiteY1" fmla="*/ 0 h 392277"/>
+                <a:gd name="connsiteX2" fmla="*/ 4226560 w 4226560"/>
+                <a:gd name="connsiteY2" fmla="*/ 392277 h 392277"/>
+                <a:gd name="connsiteX3" fmla="*/ 0 w 4226560"/>
+                <a:gd name="connsiteY3" fmla="*/ 392277 h 392277"/>
+                <a:gd name="connsiteX4" fmla="*/ 0 w 4226560"/>
+                <a:gd name="connsiteY4" fmla="*/ 0 h 392277"/>
+              </a:gdLst>
+              <a:ahLst/>
+              <a:cxnLst>
+                <a:cxn ang="0">
+                  <a:pos x="connsiteX0" y="connsiteY0"/>
+                </a:cxn>
+                <a:cxn ang="0">
+                  <a:pos x="connsiteX1" y="connsiteY1"/>
+                </a:cxn>
+                <a:cxn ang="0">
+                  <a:pos x="connsiteX2" y="connsiteY2"/>
+                </a:cxn>
+                <a:cxn ang="0">
+                  <a:pos x="connsiteX3" y="connsiteY3"/>
+                </a:cxn>
+                <a:cxn ang="0">
+                  <a:pos x="connsiteX4" y="connsiteY4"/>
+                </a:cxn>
+              </a:cxnLst>
+              <a:rect l="l" t="t" r="r" b="b"/>
+              <a:pathLst>
+                <a:path w="4226560" h="392277">
+                  <a:moveTo>
+                    <a:pt x="0" y="0"/>
+                  </a:moveTo>
+                  <a:lnTo>
+                    <a:pt x="4226560" y="0"/>
+                  </a:lnTo>
+                  <a:lnTo>
+                    <a:pt x="4226560" y="392277"/>
+                  </a:lnTo>
+                  <a:lnTo>
+                    <a:pt x="0" y="392277"/>
+                  </a:lnTo>
+                  <a:lnTo>
+                    <a:pt x="0" y="0"/>
+                  </a:lnTo>
+                  <a:close/>
+                </a:path>
+              </a:pathLst>
+            </a:custGeom>
+          </p:spPr>
+          <p:style>
+            <a:lnRef idx="0">
+              <a:schemeClr val="dk1">
+                <a:alpha val="0"/>
+                <a:hueOff val="0"/>
+                <a:satOff val="0"/>
+                <a:lumOff val="0"/>
+                <a:alphaOff val="0"/>
+              </a:schemeClr>
+            </a:lnRef>
+            <a:fillRef idx="0">
+              <a:schemeClr val="lt1">
+                <a:alpha val="0"/>
+                <a:hueOff val="0"/>
+                <a:satOff val="0"/>
+                <a:lumOff val="0"/>
+                <a:alphaOff val="0"/>
+              </a:schemeClr>
+            </a:fillRef>
+            <a:effectRef idx="0">
+              <a:schemeClr val="lt1">
+                <a:alpha val="0"/>
+                <a:hueOff val="0"/>
+                <a:satOff val="0"/>
+                <a:lumOff val="0"/>
+                <a:alphaOff val="0"/>
+              </a:schemeClr>
+            </a:effectRef>
+            <a:fontRef idx="minor">
+              <a:schemeClr val="tx1">
+                <a:hueOff val="0"/>
+                <a:satOff val="0"/>
+                <a:lumOff val="0"/>
+                <a:alphaOff val="0"/>
+              </a:schemeClr>
+            </a:fontRef>
+          </p:style>
+          <p:txBody>
+            <a:bodyPr spcFirstLastPara="0" vert="horz" wrap="square" lIns="-1" tIns="-1" rIns="345967" bIns="0" numCol="1" spcCol="1270" anchor="t" anchorCtr="0">
+              <a:noAutofit/>
+            </a:bodyPr>
+            <a:lstStyle/>
+            <a:p>
+              <a:pPr lvl="0" algn="r" defTabSz="1200150">
+                <a:lnSpc>
+                  <a:spcPct val="90000"/>
+                </a:lnSpc>
+                <a:spcBef>
+                  <a:spcPct val="0"/>
+                </a:spcBef>
+                <a:spcAft>
+                  <a:spcPct val="35000"/>
+                </a:spcAft>
+              </a:pPr>
+              <a:endParaRPr lang="tr-TR" sz="2700" kern="1200"/>
+            </a:p>
+          </p:txBody>
+        </p:sp>
+        <p:sp>
+          <p:nvSpPr>
+            <p:cNvPr id="29" name="Serbest Form 28"/>
+            <p:cNvSpPr/>
+            <p:nvPr/>
+          </p:nvSpPr>
+          <p:spPr>
+            <a:xfrm>
+              <a:off x="8156694" y="1574622"/>
+              <a:ext cx="2449259" cy="3762172"/>
+            </a:xfrm>
+            <a:custGeom>
+              <a:avLst/>
+              <a:gdLst>
+                <a:gd name="connsiteX0" fmla="*/ 0 w 1953958"/>
+                <a:gd name="connsiteY0" fmla="*/ 0 h 4226560"/>
+                <a:gd name="connsiteX1" fmla="*/ 1953958 w 1953958"/>
+                <a:gd name="connsiteY1" fmla="*/ 0 h 4226560"/>
+                <a:gd name="connsiteX2" fmla="*/ 1953958 w 1953958"/>
+                <a:gd name="connsiteY2" fmla="*/ 4226560 h 4226560"/>
+                <a:gd name="connsiteX3" fmla="*/ 0 w 1953958"/>
+                <a:gd name="connsiteY3" fmla="*/ 4226560 h 4226560"/>
+                <a:gd name="connsiteX4" fmla="*/ 0 w 1953958"/>
+                <a:gd name="connsiteY4" fmla="*/ 0 h 4226560"/>
+              </a:gdLst>
+              <a:ahLst/>
+              <a:cxnLst>
+                <a:cxn ang="0">
+                  <a:pos x="connsiteX0" y="connsiteY0"/>
+                </a:cxn>
+                <a:cxn ang="0">
+                  <a:pos x="connsiteX1" y="connsiteY1"/>
+                </a:cxn>
+                <a:cxn ang="0">
+                  <a:pos x="connsiteX2" y="connsiteY2"/>
+                </a:cxn>
+                <a:cxn ang="0">
+                  <a:pos x="connsiteX3" y="connsiteY3"/>
+                </a:cxn>
+                <a:cxn ang="0">
+                  <a:pos x="connsiteX4" y="connsiteY4"/>
+                </a:cxn>
+              </a:cxnLst>
+              <a:rect l="l" t="t" r="r" b="b"/>
+              <a:pathLst>
+                <a:path w="1953958" h="4226560">
+                  <a:moveTo>
+                    <a:pt x="0" y="0"/>
+                  </a:moveTo>
+                  <a:lnTo>
+                    <a:pt x="1953958" y="0"/>
+                  </a:lnTo>
+                  <a:lnTo>
+                    <a:pt x="1953958" y="4226560"/>
+                  </a:lnTo>
+                  <a:lnTo>
+                    <a:pt x="0" y="4226560"/>
+                  </a:lnTo>
+                  <a:lnTo>
+                    <a:pt x="0" y="0"/>
+                  </a:lnTo>
+                  <a:close/>
+                </a:path>
+              </a:pathLst>
+            </a:custGeom>
+          </p:spPr>
+          <p:style>
+            <a:lnRef idx="2">
+              <a:schemeClr val="lt1">
+                <a:hueOff val="0"/>
+                <a:satOff val="0"/>
+                <a:lumOff val="0"/>
+                <a:alphaOff val="0"/>
+              </a:schemeClr>
+            </a:lnRef>
+            <a:fillRef idx="1">
+              <a:schemeClr val="accent1">
+                <a:hueOff val="0"/>
+                <a:satOff val="0"/>
+                <a:lumOff val="0"/>
+                <a:alphaOff val="0"/>
+              </a:schemeClr>
+            </a:fillRef>
+            <a:effectRef idx="0">
+              <a:schemeClr val="accent1">
+                <a:hueOff val="0"/>
+                <a:satOff val="0"/>
+                <a:lumOff val="0"/>
+                <a:alphaOff val="0"/>
+              </a:schemeClr>
+            </a:effectRef>
+            <a:fontRef idx="minor">
+              <a:schemeClr val="lt1"/>
+            </a:fontRef>
+          </p:style>
+          <p:txBody>
+            <a:bodyPr spcFirstLastPara="0" vert="horz" wrap="square" lIns="248920" tIns="345967" rIns="248920" bIns="248920" numCol="1" spcCol="1270" anchor="t" anchorCtr="0">
+              <a:noAutofit/>
+            </a:bodyPr>
+            <a:lstStyle/>
+            <a:p>
+              <a:pPr marL="228600" lvl="1" indent="-228600" defTabSz="1200150">
+                <a:lnSpc>
+                  <a:spcPct val="90000"/>
+                </a:lnSpc>
+                <a:spcBef>
+                  <a:spcPct val="0"/>
+                </a:spcBef>
+                <a:spcAft>
+                  <a:spcPct val="15000"/>
+                </a:spcAft>
+                <a:buChar char="••"/>
+              </a:pPr>
+              <a:r>
+                <a:rPr lang="tr-TR" sz="1200" dirty="0"/>
+                <a:t>Tablolar</a:t>
+              </a:r>
+            </a:p>
+            <a:p>
+              <a:pPr marL="685800" lvl="2" indent="-228600" defTabSz="1200150">
+                <a:lnSpc>
+                  <a:spcPct val="90000"/>
+                </a:lnSpc>
+                <a:spcBef>
+                  <a:spcPct val="0"/>
+                </a:spcBef>
+                <a:spcAft>
+                  <a:spcPct val="15000"/>
+                </a:spcAft>
+                <a:buChar char="••"/>
+              </a:pPr>
+              <a:r>
+                <a:rPr lang="tr-TR" sz="1200" dirty="0" err="1"/>
+                <a:t>wp_posts</a:t>
+              </a:r>
+              <a:endParaRPr lang="tr-TR" sz="1200" dirty="0"/>
+            </a:p>
+            <a:p>
+              <a:pPr marL="685800" lvl="2" indent="-228600" defTabSz="1200150">
+                <a:lnSpc>
+                  <a:spcPct val="90000"/>
+                </a:lnSpc>
+                <a:spcBef>
+                  <a:spcPct val="0"/>
+                </a:spcBef>
+                <a:spcAft>
+                  <a:spcPct val="15000"/>
+                </a:spcAft>
+                <a:buChar char="••"/>
+              </a:pPr>
+              <a:r>
+                <a:rPr lang="tr-TR" sz="1200" dirty="0" err="1"/>
+                <a:t>wp_postmeta</a:t>
+              </a:r>
+              <a:endParaRPr lang="tr-TR" sz="1200" dirty="0"/>
+            </a:p>
+            <a:p>
+              <a:pPr marL="685800" lvl="2" indent="-228600" defTabSz="1200150">
+                <a:lnSpc>
+                  <a:spcPct val="90000"/>
+                </a:lnSpc>
+                <a:spcBef>
+                  <a:spcPct val="0"/>
+                </a:spcBef>
+                <a:spcAft>
+                  <a:spcPct val="15000"/>
+                </a:spcAft>
+                <a:buChar char="••"/>
+              </a:pPr>
+              <a:r>
+                <a:rPr lang="tr-TR" sz="1200" dirty="0" err="1"/>
+                <a:t>wp_users</a:t>
+              </a:r>
+              <a:endParaRPr lang="tr-TR" sz="1200" dirty="0"/>
+            </a:p>
+            <a:p>
+              <a:pPr marL="685800" lvl="2" indent="-228600" defTabSz="1200150">
+                <a:lnSpc>
+                  <a:spcPct val="90000"/>
+                </a:lnSpc>
+                <a:spcBef>
+                  <a:spcPct val="0"/>
+                </a:spcBef>
+                <a:spcAft>
+                  <a:spcPct val="15000"/>
+                </a:spcAft>
+                <a:buChar char="••"/>
+              </a:pPr>
+              <a:r>
+                <a:rPr lang="tr-TR" sz="1200" dirty="0" err="1"/>
+                <a:t>wp_usermeta</a:t>
+              </a:r>
+              <a:endParaRPr lang="tr-TR" sz="1200" dirty="0"/>
+            </a:p>
+            <a:p>
+              <a:pPr marL="685800" lvl="2" indent="-228600" defTabSz="1200150">
+                <a:lnSpc>
+                  <a:spcPct val="90000"/>
+                </a:lnSpc>
+                <a:spcBef>
+                  <a:spcPct val="0"/>
+                </a:spcBef>
+                <a:spcAft>
+                  <a:spcPct val="15000"/>
+                </a:spcAft>
+                <a:buChar char="••"/>
+              </a:pPr>
+              <a:r>
+                <a:rPr lang="tr-TR" sz="1200" dirty="0" err="1"/>
+                <a:t>wp_comments</a:t>
+              </a:r>
+              <a:endParaRPr lang="tr-TR" sz="1200" dirty="0"/>
+            </a:p>
+            <a:p>
+              <a:pPr marL="685800" lvl="2" indent="-228600" defTabSz="1200150">
+                <a:lnSpc>
+                  <a:spcPct val="90000"/>
+                </a:lnSpc>
+                <a:spcBef>
+                  <a:spcPct val="0"/>
+                </a:spcBef>
+                <a:spcAft>
+                  <a:spcPct val="15000"/>
+                </a:spcAft>
+                <a:buChar char="••"/>
+              </a:pPr>
+              <a:r>
+                <a:rPr lang="tr-TR" sz="1200" dirty="0" err="1"/>
+                <a:t>wp_commentmeta</a:t>
+              </a:r>
+              <a:endParaRPr lang="tr-TR" sz="1200" dirty="0"/>
+            </a:p>
+            <a:p>
+              <a:pPr marL="228600" lvl="1" indent="-228600" algn="l" defTabSz="1200150">
+                <a:lnSpc>
+                  <a:spcPct val="90000"/>
+                </a:lnSpc>
+                <a:spcBef>
+                  <a:spcPct val="0"/>
+                </a:spcBef>
+                <a:spcAft>
+                  <a:spcPct val="15000"/>
+                </a:spcAft>
+                <a:buChar char="••"/>
+              </a:pPr>
+              <a:endParaRPr lang="tr-TR" sz="2700" kern="1200" dirty="0" smtClean="0"/>
+            </a:p>
+            <a:p>
+              <a:pPr marL="228600" lvl="1" indent="-228600" algn="l" defTabSz="1200150">
+                <a:lnSpc>
+                  <a:spcPct val="90000"/>
+                </a:lnSpc>
+                <a:spcBef>
+                  <a:spcPct val="0"/>
+                </a:spcBef>
+                <a:spcAft>
+                  <a:spcPct val="15000"/>
+                </a:spcAft>
+                <a:buChar char="••"/>
+              </a:pPr>
+              <a:r>
+                <a:rPr lang="tr-TR" sz="1200" dirty="0" smtClean="0"/>
+                <a:t>Ekran</a:t>
+              </a:r>
+              <a:endParaRPr lang="tr-TR" sz="1200" kern="1200" dirty="0"/>
+            </a:p>
+            <a:p>
+              <a:pPr marL="228600" lvl="1" indent="-228600" algn="l" defTabSz="1200150">
+                <a:lnSpc>
+                  <a:spcPct val="90000"/>
+                </a:lnSpc>
+                <a:spcBef>
+                  <a:spcPct val="0"/>
+                </a:spcBef>
+                <a:spcAft>
+                  <a:spcPct val="15000"/>
+                </a:spcAft>
+                <a:buChar char="••"/>
+              </a:pPr>
+              <a:endParaRPr lang="tr-TR" sz="2700" kern="1200" dirty="0"/>
+            </a:p>
+          </p:txBody>
+        </p:sp>
+        <p:sp>
+          <p:nvSpPr>
+            <p:cNvPr id="30" name="Dikdörtgen 29"/>
+            <p:cNvSpPr/>
+            <p:nvPr/>
+          </p:nvSpPr>
+          <p:spPr>
+            <a:xfrm>
+              <a:off x="8540029" y="1027975"/>
+              <a:ext cx="1037047" cy="392277"/>
+            </a:xfrm>
+            <a:prstGeom prst="rect">
+              <a:avLst/>
+            </a:prstGeom>
+          </p:spPr>
+          <p:style>
+            <a:lnRef idx="2">
+              <a:schemeClr val="lt1">
+                <a:hueOff val="0"/>
+                <a:satOff val="0"/>
+                <a:lumOff val="0"/>
+                <a:alphaOff val="0"/>
+              </a:schemeClr>
+            </a:lnRef>
+            <a:fillRef idx="1">
+              <a:schemeClr val="accent1">
+                <a:tint val="50000"/>
+                <a:hueOff val="0"/>
+                <a:satOff val="0"/>
+                <a:lumOff val="0"/>
+                <a:alphaOff val="0"/>
+              </a:schemeClr>
+            </a:fillRef>
+            <a:effectRef idx="0">
+              <a:schemeClr val="accent1">
+                <a:tint val="50000"/>
+                <a:hueOff val="0"/>
+                <a:satOff val="0"/>
+                <a:lumOff val="0"/>
+                <a:alphaOff val="0"/>
+              </a:schemeClr>
+            </a:effectRef>
+            <a:fontRef idx="minor">
+              <a:schemeClr val="lt1">
+                <a:hueOff val="0"/>
+                <a:satOff val="0"/>
+                <a:lumOff val="0"/>
+                <a:alphaOff val="0"/>
+              </a:schemeClr>
+            </a:fontRef>
+          </p:style>
+          <p:txBody>
+            <a:bodyPr/>
+            <a:lstStyle/>
+            <a:p>
+              <a:pPr algn="ctr"/>
+              <a:r>
+                <a:rPr lang="tr-TR" dirty="0" err="1" smtClean="0"/>
+                <a:t>Output</a:t>
+              </a:r>
+              <a:endParaRPr lang="tr-TR" dirty="0"/>
+            </a:p>
+          </p:txBody>
+        </p:sp>
+      </p:grpSp>
+      <p:grpSp>
+        <p:nvGrpSpPr>
+          <p:cNvPr id="15" name="Grup 14"/>
+          <p:cNvGrpSpPr/>
+          <p:nvPr/>
+        </p:nvGrpSpPr>
+        <p:grpSpPr>
+          <a:xfrm>
+            <a:off x="4728644" y="2370456"/>
+            <a:ext cx="2229664" cy="1913610"/>
+            <a:chOff x="4883766" y="2220684"/>
+            <a:chExt cx="2229664" cy="1913610"/>
+          </a:xfrm>
+        </p:grpSpPr>
+        <p:sp>
+          <p:nvSpPr>
+            <p:cNvPr id="19" name="Dikdörtgen 18"/>
+            <p:cNvSpPr/>
+            <p:nvPr/>
+          </p:nvSpPr>
+          <p:spPr>
+            <a:xfrm>
+              <a:off x="4883766" y="2220684"/>
+              <a:ext cx="2204357" cy="1913610"/>
+            </a:xfrm>
+            <a:prstGeom prst="rect">
+              <a:avLst/>
+            </a:prstGeom>
+          </p:spPr>
+          <p:style>
+            <a:lnRef idx="2">
+              <a:schemeClr val="accent1">
+                <a:shade val="50000"/>
+              </a:schemeClr>
+            </a:lnRef>
+            <a:fillRef idx="1">
+              <a:schemeClr val="accent1"/>
+            </a:fillRef>
+            <a:effectRef idx="0">
+              <a:schemeClr val="accent1"/>
+            </a:effectRef>
+            <a:fontRef idx="minor">
+              <a:schemeClr val="lt1"/>
+            </a:fontRef>
+          </p:style>
+          <p:txBody>
+            <a:bodyPr rtlCol="0" anchor="ctr"/>
+            <a:lstStyle/>
+            <a:p>
+              <a:pPr algn="ctr"/>
+              <a:endParaRPr lang="tr-TR"/>
+            </a:p>
+          </p:txBody>
+        </p:sp>
+        <p:sp>
+          <p:nvSpPr>
+            <p:cNvPr id="20" name="Metin kutusu 19"/>
+            <p:cNvSpPr txBox="1"/>
+            <p:nvPr/>
+          </p:nvSpPr>
+          <p:spPr>
+            <a:xfrm>
+              <a:off x="4949078" y="3219356"/>
+              <a:ext cx="2164352" cy="914937"/>
+            </a:xfrm>
+            <a:prstGeom prst="rect">
+              <a:avLst/>
+            </a:prstGeom>
+            <a:noFill/>
+          </p:spPr>
+          <p:txBody>
+            <a:bodyPr wrap="square" rtlCol="0">
+              <a:spAutoFit/>
+            </a:bodyPr>
+            <a:lstStyle/>
+            <a:p>
+              <a:pPr marL="228600" lvl="1" indent="-228600" defTabSz="1200150">
+                <a:lnSpc>
+                  <a:spcPct val="90000"/>
+                </a:lnSpc>
+                <a:spcBef>
+                  <a:spcPct val="0"/>
+                </a:spcBef>
+                <a:spcAft>
+                  <a:spcPct val="15000"/>
+                </a:spcAft>
+                <a:buChar char="••"/>
+              </a:pPr>
+              <a:r>
+                <a:rPr lang="tr-TR" sz="1200" dirty="0"/>
+                <a:t>Makale</a:t>
+              </a:r>
+            </a:p>
+            <a:p>
+              <a:pPr marL="685800" lvl="2" indent="-228600" defTabSz="1200150">
+                <a:lnSpc>
+                  <a:spcPct val="90000"/>
+                </a:lnSpc>
+                <a:spcBef>
+                  <a:spcPct val="0"/>
+                </a:spcBef>
+                <a:spcAft>
+                  <a:spcPct val="15000"/>
+                </a:spcAft>
+                <a:buChar char="••"/>
+              </a:pPr>
+              <a:r>
+                <a:rPr lang="tr-TR" sz="1200" dirty="0"/>
+                <a:t>Makale ekle</a:t>
+              </a:r>
+            </a:p>
+            <a:p>
+              <a:pPr marL="685800" lvl="2" indent="-228600" defTabSz="1200150">
+                <a:lnSpc>
+                  <a:spcPct val="90000"/>
+                </a:lnSpc>
+                <a:spcBef>
+                  <a:spcPct val="0"/>
+                </a:spcBef>
+                <a:spcAft>
+                  <a:spcPct val="15000"/>
+                </a:spcAft>
+                <a:buChar char="••"/>
+              </a:pPr>
+              <a:r>
+                <a:rPr lang="tr-TR" sz="1200" dirty="0"/>
+                <a:t>Makale Sil</a:t>
+              </a:r>
+            </a:p>
+            <a:p>
+              <a:pPr marL="685800" lvl="2" indent="-228600" defTabSz="1200150">
+                <a:lnSpc>
+                  <a:spcPct val="90000"/>
+                </a:lnSpc>
+                <a:spcBef>
+                  <a:spcPct val="0"/>
+                </a:spcBef>
+                <a:spcAft>
+                  <a:spcPct val="15000"/>
+                </a:spcAft>
+                <a:buChar char="••"/>
+              </a:pPr>
+              <a:r>
+                <a:rPr lang="tr-TR" sz="1200" dirty="0"/>
+                <a:t>Makale Güncelle</a:t>
+              </a:r>
+            </a:p>
+          </p:txBody>
+        </p:sp>
+        <p:sp>
+          <p:nvSpPr>
+            <p:cNvPr id="21" name="Metin kutusu 20"/>
+            <p:cNvSpPr txBox="1"/>
+            <p:nvPr/>
+          </p:nvSpPr>
+          <p:spPr>
+            <a:xfrm>
+              <a:off x="4949078" y="2316983"/>
+              <a:ext cx="2077813" cy="840230"/>
+            </a:xfrm>
+            <a:prstGeom prst="rect">
+              <a:avLst/>
+            </a:prstGeom>
+            <a:noFill/>
+          </p:spPr>
+          <p:txBody>
+            <a:bodyPr wrap="none" rtlCol="0">
+              <a:spAutoFit/>
+            </a:bodyPr>
+            <a:lstStyle/>
+            <a:p>
+              <a:pPr marL="228600" lvl="1" indent="-228600" defTabSz="1200150">
+                <a:lnSpc>
+                  <a:spcPct val="90000"/>
+                </a:lnSpc>
+                <a:spcBef>
+                  <a:spcPct val="0"/>
+                </a:spcBef>
+                <a:spcAft>
+                  <a:spcPct val="15000"/>
+                </a:spcAft>
+                <a:buChar char="••"/>
+              </a:pPr>
+              <a:r>
+                <a:rPr lang="tr-TR" sz="1200" dirty="0"/>
+                <a:t>Yorum</a:t>
+              </a:r>
+            </a:p>
+            <a:p>
+              <a:pPr marL="685800" lvl="2" indent="-228600" defTabSz="1200150">
+                <a:lnSpc>
+                  <a:spcPct val="90000"/>
+                </a:lnSpc>
+                <a:spcBef>
+                  <a:spcPct val="0"/>
+                </a:spcBef>
+                <a:spcAft>
+                  <a:spcPct val="15000"/>
+                </a:spcAft>
+                <a:buChar char="••"/>
+              </a:pPr>
+              <a:r>
+                <a:rPr lang="tr-TR" sz="1200" dirty="0"/>
+                <a:t>Yorum Onayla</a:t>
+              </a:r>
+            </a:p>
+            <a:p>
+              <a:pPr marL="685800" lvl="2" indent="-228600" defTabSz="1200150">
+                <a:lnSpc>
+                  <a:spcPct val="90000"/>
+                </a:lnSpc>
+                <a:spcBef>
+                  <a:spcPct val="0"/>
+                </a:spcBef>
+                <a:spcAft>
+                  <a:spcPct val="15000"/>
+                </a:spcAft>
+                <a:buChar char="••"/>
+              </a:pPr>
+              <a:r>
+                <a:rPr lang="tr-TR" sz="1200" dirty="0"/>
+                <a:t>Yorum Sil</a:t>
+              </a:r>
+            </a:p>
+            <a:p>
+              <a:pPr marL="685800" lvl="2" indent="-228600" defTabSz="1200150">
+                <a:lnSpc>
+                  <a:spcPct val="90000"/>
+                </a:lnSpc>
+                <a:spcBef>
+                  <a:spcPct val="0"/>
+                </a:spcBef>
+                <a:spcAft>
+                  <a:spcPct val="15000"/>
+                </a:spcAft>
+                <a:buChar char="••"/>
+              </a:pPr>
+              <a:r>
+                <a:rPr lang="tr-TR" sz="1200" dirty="0"/>
+                <a:t>Yorum Güncelle</a:t>
+              </a:r>
+            </a:p>
+          </p:txBody>
+        </p:sp>
+      </p:grpSp>
+      <p:grpSp>
+        <p:nvGrpSpPr>
+          <p:cNvPr id="16" name="Grup 15"/>
+          <p:cNvGrpSpPr/>
+          <p:nvPr/>
+        </p:nvGrpSpPr>
+        <p:grpSpPr>
+          <a:xfrm>
+            <a:off x="4719793" y="4860573"/>
+            <a:ext cx="2204357" cy="955221"/>
+            <a:chOff x="4883765" y="4286250"/>
+            <a:chExt cx="2204357" cy="955221"/>
+          </a:xfrm>
+        </p:grpSpPr>
+        <p:sp>
+          <p:nvSpPr>
+            <p:cNvPr id="17" name="Dikdörtgen 16"/>
+            <p:cNvSpPr/>
+            <p:nvPr/>
+          </p:nvSpPr>
+          <p:spPr>
+            <a:xfrm>
+              <a:off x="4883765" y="4286250"/>
+              <a:ext cx="2204357" cy="955221"/>
+            </a:xfrm>
+            <a:prstGeom prst="rect">
+              <a:avLst/>
+            </a:prstGeom>
+          </p:spPr>
+          <p:style>
+            <a:lnRef idx="2">
+              <a:schemeClr val="accent1">
+                <a:shade val="50000"/>
+              </a:schemeClr>
+            </a:lnRef>
+            <a:fillRef idx="1">
+              <a:schemeClr val="accent1"/>
+            </a:fillRef>
+            <a:effectRef idx="0">
+              <a:schemeClr val="accent1"/>
+            </a:effectRef>
+            <a:fontRef idx="minor">
+              <a:schemeClr val="lt1"/>
+            </a:fontRef>
+          </p:style>
+          <p:txBody>
+            <a:bodyPr rtlCol="0" anchor="ctr"/>
+            <a:lstStyle/>
+            <a:p>
+              <a:pPr algn="ctr"/>
+              <a:endParaRPr lang="tr-TR"/>
+            </a:p>
+          </p:txBody>
+        </p:sp>
+        <p:sp>
+          <p:nvSpPr>
+            <p:cNvPr id="18" name="Metin kutusu 17"/>
+            <p:cNvSpPr txBox="1"/>
+            <p:nvPr/>
+          </p:nvSpPr>
+          <p:spPr>
+            <a:xfrm>
+              <a:off x="5006082" y="4351915"/>
+              <a:ext cx="1321196" cy="840230"/>
+            </a:xfrm>
+            <a:prstGeom prst="rect">
+              <a:avLst/>
+            </a:prstGeom>
+            <a:noFill/>
+          </p:spPr>
+          <p:txBody>
+            <a:bodyPr wrap="none" rtlCol="0">
+              <a:spAutoFit/>
+            </a:bodyPr>
+            <a:lstStyle/>
+            <a:p>
+              <a:pPr marL="228600" lvl="1" indent="-228600" defTabSz="1200150">
+                <a:lnSpc>
+                  <a:spcPct val="90000"/>
+                </a:lnSpc>
+                <a:spcBef>
+                  <a:spcPct val="0"/>
+                </a:spcBef>
+                <a:spcAft>
+                  <a:spcPct val="15000"/>
+                </a:spcAft>
+                <a:buChar char="••"/>
+              </a:pPr>
+              <a:r>
+                <a:rPr lang="tr-TR" sz="1200" dirty="0"/>
+                <a:t>Makale Oku</a:t>
+              </a:r>
+            </a:p>
+            <a:p>
+              <a:pPr marL="228600" lvl="1" indent="-228600" defTabSz="1200150">
+                <a:lnSpc>
+                  <a:spcPct val="90000"/>
+                </a:lnSpc>
+                <a:spcBef>
+                  <a:spcPct val="0"/>
+                </a:spcBef>
+                <a:spcAft>
+                  <a:spcPct val="15000"/>
+                </a:spcAft>
+                <a:buChar char="••"/>
+              </a:pPr>
+              <a:r>
+                <a:rPr lang="tr-TR" sz="1200" dirty="0"/>
+                <a:t>Yorum Oku</a:t>
+              </a:r>
+            </a:p>
+            <a:p>
+              <a:pPr marL="228600" lvl="1" indent="-228600" defTabSz="1200150">
+                <a:lnSpc>
+                  <a:spcPct val="90000"/>
+                </a:lnSpc>
+                <a:spcBef>
+                  <a:spcPct val="0"/>
+                </a:spcBef>
+                <a:spcAft>
+                  <a:spcPct val="15000"/>
+                </a:spcAft>
+                <a:buChar char="••"/>
+              </a:pPr>
+              <a:r>
+                <a:rPr lang="tr-TR" sz="1200" dirty="0"/>
+                <a:t>Yorum Yaz</a:t>
+              </a:r>
+            </a:p>
+            <a:p>
+              <a:pPr marL="228600" lvl="1" indent="-228600" defTabSz="1200150">
+                <a:lnSpc>
+                  <a:spcPct val="90000"/>
+                </a:lnSpc>
+                <a:spcBef>
+                  <a:spcPct val="0"/>
+                </a:spcBef>
+                <a:spcAft>
+                  <a:spcPct val="15000"/>
+                </a:spcAft>
+                <a:buChar char="••"/>
+              </a:pPr>
+              <a:r>
+                <a:rPr lang="tr-TR" sz="1200" dirty="0"/>
+                <a:t>Paylaş</a:t>
+              </a:r>
+            </a:p>
+          </p:txBody>
+        </p:sp>
+      </p:grpSp>
+    </p:spTree>
+    <p:extLst>
+      <p:ext uri="{BB962C8B-B14F-4D97-AF65-F5344CB8AC3E}">
+        <p14:creationId xmlns:p14="http://schemas.microsoft.com/office/powerpoint/2010/main" val="1961571266"/>
+      </p:ext>
+    </p:extLst>
+  </p:cSld>
+  <p:clrMapOvr>
+    <a:masterClrMapping/>
+  </p:clrMapOvr>
+  <p:timing>
+    <p:tnLst>
+      <p:par>
+        <p:cTn id="1" dur="indefinite" restart="never" nodeType="tmRoot"/>
+      </p:par>
+    </p:tnLst>
+  </p:timing>
 </p:sld>
 </file>
 

</xml_diff>